<commit_message>
got basic structure down in powerpoint and excel. need to break things up into reasonable work sections
</commit_message>
<xml_diff>
--- a/documentation/final_project_planning.pptx
+++ b/documentation/final_project_planning.pptx
@@ -5,15 +5,16 @@
     <p:sldMasterId id="2147483648" r:id="rId1"/>
   </p:sldMasterIdLst>
   <p:notesMasterIdLst>
-    <p:notesMasterId r:id="rId8"/>
+    <p:notesMasterId r:id="rId9"/>
   </p:notesMasterIdLst>
   <p:sldIdLst>
-    <p:sldId id="269" r:id="rId2"/>
-    <p:sldId id="267" r:id="rId3"/>
-    <p:sldId id="278" r:id="rId4"/>
-    <p:sldId id="279" r:id="rId5"/>
-    <p:sldId id="277" r:id="rId6"/>
-    <p:sldId id="280" r:id="rId7"/>
+    <p:sldId id="281" r:id="rId2"/>
+    <p:sldId id="269" r:id="rId3"/>
+    <p:sldId id="267" r:id="rId4"/>
+    <p:sldId id="278" r:id="rId5"/>
+    <p:sldId id="279" r:id="rId6"/>
+    <p:sldId id="277" r:id="rId7"/>
+    <p:sldId id="280" r:id="rId8"/>
   </p:sldIdLst>
   <p:sldSz cx="12192000" cy="6858000"/>
   <p:notesSz cx="6858000" cy="9144000"/>
@@ -124,94 +125,6 @@
 <p188:authorLst xmlns:a="http://schemas.openxmlformats.org/drawingml/2006/main" xmlns:r="http://schemas.openxmlformats.org/officeDocument/2006/relationships" xmlns:p188="http://schemas.microsoft.com/office/powerpoint/2018/8/main">
   <p188:author id="{F4528AED-D83D-A577-60C4-88E8BD19D895}" name="Steven Vazquez" initials="SV" userId="b4cc20b1c9d944c8" providerId="Windows Live"/>
 </p188:authorLst>
-</file>
-
-<file path=ppt/comments/modernComment_115_94D04B26.xml><?xml version="1.0" encoding="utf-8"?>
-<p188:cmLst xmlns:a="http://schemas.openxmlformats.org/drawingml/2006/main" xmlns:r="http://schemas.openxmlformats.org/officeDocument/2006/relationships" xmlns:p188="http://schemas.microsoft.com/office/powerpoint/2018/8/main">
-  <p188:cm id="{2A74D6AB-3527-4CEA-AE28-646E296DECF4}" authorId="{F4528AED-D83D-A577-60C4-88E8BD19D895}" created="2023-11-06T00:46:20.340">
-    <ac:deMkLst xmlns:ac="http://schemas.microsoft.com/office/drawing/2013/main/command">
-      <pc:docMk xmlns:pc="http://schemas.microsoft.com/office/powerpoint/2013/main/command"/>
-      <pc:sldMk xmlns:pc="http://schemas.microsoft.com/office/powerpoint/2013/main/command" cId="2881041793" sldId="269"/>
-      <ac:spMk id="20" creationId="{E4D0A74E-41DD-4F73-4EB2-C1D35A4EF610}"/>
-    </ac:deMkLst>
-    <p188:txBody>
-      <a:bodyPr/>
-      <a:lstStyle/>
-      <a:p>
-        <a:r>
-          <a:rPr lang="en-US"/>
-          <a:t>Checkbox for upvote</a:t>
-        </a:r>
-      </a:p>
-    </p188:txBody>
-  </p188:cm>
-</p188:cmLst>
-</file>
-
-<file path=ppt/comments/modernComment_116_921366EA.xml><?xml version="1.0" encoding="utf-8"?>
-<p188:cmLst xmlns:a="http://schemas.openxmlformats.org/drawingml/2006/main" xmlns:r="http://schemas.openxmlformats.org/officeDocument/2006/relationships" xmlns:p188="http://schemas.microsoft.com/office/powerpoint/2018/8/main">
-  <p188:cm id="{9B0E1A88-AE89-4A24-A432-79189D8AD301}" authorId="{F4528AED-D83D-A577-60C4-88E8BD19D895}" created="2023-11-06T00:46:20.340">
-    <ac:deMkLst xmlns:ac="http://schemas.microsoft.com/office/drawing/2013/main/command">
-      <pc:docMk xmlns:pc="http://schemas.microsoft.com/office/powerpoint/2013/main/command"/>
-      <pc:sldMk xmlns:pc="http://schemas.microsoft.com/office/powerpoint/2013/main/command" cId="2881041793" sldId="269"/>
-      <ac:spMk id="20" creationId="{E4D0A74E-41DD-4F73-4EB2-C1D35A4EF610}"/>
-    </ac:deMkLst>
-    <p188:txBody>
-      <a:bodyPr/>
-      <a:lstStyle/>
-      <a:p>
-        <a:r>
-          <a:rPr lang="en-US"/>
-          <a:t>Checkbox for upvote</a:t>
-        </a:r>
-      </a:p>
-    </p188:txBody>
-  </p188:cm>
-</p188:cmLst>
-</file>
-
-<file path=ppt/comments/modernComment_117_B8E1A3A6.xml><?xml version="1.0" encoding="utf-8"?>
-<p188:cmLst xmlns:a="http://schemas.openxmlformats.org/drawingml/2006/main" xmlns:r="http://schemas.openxmlformats.org/officeDocument/2006/relationships" xmlns:p188="http://schemas.microsoft.com/office/powerpoint/2018/8/main">
-  <p188:cm id="{3CB4655C-FF72-4479-802A-0078F0AE92F2}" authorId="{F4528AED-D83D-A577-60C4-88E8BD19D895}" created="2023-11-06T00:46:20.340">
-    <ac:deMkLst xmlns:ac="http://schemas.microsoft.com/office/drawing/2013/main/command">
-      <pc:docMk xmlns:pc="http://schemas.microsoft.com/office/powerpoint/2013/main/command"/>
-      <pc:sldMk xmlns:pc="http://schemas.microsoft.com/office/powerpoint/2013/main/command" cId="2881041793" sldId="269"/>
-      <ac:spMk id="20" creationId="{E4D0A74E-41DD-4F73-4EB2-C1D35A4EF610}"/>
-    </ac:deMkLst>
-    <p188:txBody>
-      <a:bodyPr/>
-      <a:lstStyle/>
-      <a:p>
-        <a:r>
-          <a:rPr lang="en-US"/>
-          <a:t>Checkbox for upvote</a:t>
-        </a:r>
-      </a:p>
-    </p188:txBody>
-  </p188:cm>
-</p188:cmLst>
-</file>
-
-<file path=ppt/comments/modernComment_118_F93F9F8A.xml><?xml version="1.0" encoding="utf-8"?>
-<p188:cmLst xmlns:a="http://schemas.openxmlformats.org/drawingml/2006/main" xmlns:r="http://schemas.openxmlformats.org/officeDocument/2006/relationships" xmlns:p188="http://schemas.microsoft.com/office/powerpoint/2018/8/main">
-  <p188:cm id="{BE0583E7-62B4-4B23-B6C9-6FA3FE9C15D1}" authorId="{F4528AED-D83D-A577-60C4-88E8BD19D895}" created="2023-11-06T00:46:20.340">
-    <ac:deMkLst xmlns:ac="http://schemas.microsoft.com/office/drawing/2013/main/command">
-      <pc:docMk xmlns:pc="http://schemas.microsoft.com/office/powerpoint/2013/main/command"/>
-      <pc:sldMk xmlns:pc="http://schemas.microsoft.com/office/powerpoint/2013/main/command" cId="2881041793" sldId="269"/>
-      <ac:spMk id="20" creationId="{E4D0A74E-41DD-4F73-4EB2-C1D35A4EF610}"/>
-    </ac:deMkLst>
-    <p188:txBody>
-      <a:bodyPr/>
-      <a:lstStyle/>
-      <a:p>
-        <a:r>
-          <a:rPr lang="en-US"/>
-          <a:t>Checkbox for upvote</a:t>
-        </a:r>
-      </a:p>
-    </p188:txBody>
-  </p188:cm>
-</p188:cmLst>
 </file>
 
 <file path=ppt/notesMasters/notesMaster1.xml><?xml version="1.0" encoding="utf-8"?>
@@ -628,7 +541,7 @@
           <a:p>
             <a:fld id="{B06FDED3-7E68-48B3-9B1F-6E05180F61D0}" type="slidenum">
               <a:rPr lang="en-US" smtClean="0"/>
-              <a:t>1</a:t>
+              <a:t>2</a:t>
             </a:fld>
             <a:endParaRPr lang="en-US"/>
           </a:p>
@@ -712,7 +625,7 @@
           <a:p>
             <a:fld id="{B06FDED3-7E68-48B3-9B1F-6E05180F61D0}" type="slidenum">
               <a:rPr lang="en-US" smtClean="0"/>
-              <a:t>2</a:t>
+              <a:t>3</a:t>
             </a:fld>
             <a:endParaRPr lang="en-US"/>
           </a:p>
@@ -796,7 +709,7 @@
           <a:p>
             <a:fld id="{B06FDED3-7E68-48B3-9B1F-6E05180F61D0}" type="slidenum">
               <a:rPr lang="en-US" smtClean="0"/>
-              <a:t>3</a:t>
+              <a:t>4</a:t>
             </a:fld>
             <a:endParaRPr lang="en-US"/>
           </a:p>
@@ -880,7 +793,7 @@
           <a:p>
             <a:fld id="{B06FDED3-7E68-48B3-9B1F-6E05180F61D0}" type="slidenum">
               <a:rPr lang="en-US" smtClean="0"/>
-              <a:t>4</a:t>
+              <a:t>5</a:t>
             </a:fld>
             <a:endParaRPr lang="en-US"/>
           </a:p>
@@ -964,7 +877,7 @@
           <a:p>
             <a:fld id="{B06FDED3-7E68-48B3-9B1F-6E05180F61D0}" type="slidenum">
               <a:rPr lang="en-US" smtClean="0"/>
-              <a:t>5</a:t>
+              <a:t>6</a:t>
             </a:fld>
             <a:endParaRPr lang="en-US"/>
           </a:p>
@@ -1048,7 +961,7 @@
           <a:p>
             <a:fld id="{B06FDED3-7E68-48B3-9B1F-6E05180F61D0}" type="slidenum">
               <a:rPr lang="en-US" smtClean="0"/>
-              <a:t>6</a:t>
+              <a:t>7</a:t>
             </a:fld>
             <a:endParaRPr lang="en-US"/>
           </a:p>
@@ -4283,10 +4196,10 @@
       </p:grpSpPr>
       <p:sp>
         <p:nvSpPr>
-          <p:cNvPr id="3" name="Rectangle 2">
-            <a:extLst>
-              <a:ext uri="{FF2B5EF4-FFF2-40B4-BE49-F238E27FC236}">
-                <a16:creationId xmlns:a16="http://schemas.microsoft.com/office/drawing/2014/main" id="{09EB6145-F196-BA75-4B3E-EED7851B2ACB}"/>
+          <p:cNvPr id="4" name="Rectangle 3">
+            <a:extLst>
+              <a:ext uri="{FF2B5EF4-FFF2-40B4-BE49-F238E27FC236}">
+                <a16:creationId xmlns:a16="http://schemas.microsoft.com/office/drawing/2014/main" id="{170326A1-CD9D-E284-FACF-3CDDD20FFD4A}"/>
               </a:ext>
             </a:extLst>
           </p:cNvPr>
@@ -4295,15 +4208,13 @@
         </p:nvSpPr>
         <p:spPr>
           <a:xfrm>
-            <a:off x="242835" y="200967"/>
-            <a:ext cx="11706330" cy="6451042"/>
+            <a:off x="1344245" y="251488"/>
+            <a:ext cx="10089663" cy="6355024"/>
           </a:xfrm>
           <a:prstGeom prst="rect">
             <a:avLst/>
           </a:prstGeom>
-          <a:solidFill>
-            <a:schemeClr val="bg1"/>
-          </a:solidFill>
+          <a:noFill/>
         </p:spPr>
         <p:style>
           <a:lnRef idx="2">
@@ -4326,35 +4237,65 @@
           <a:lstStyle/>
           <a:p>
             <a:pPr algn="ctr"/>
-            <a:endParaRPr lang="en-US" dirty="0">
-              <a:solidFill>
-                <a:schemeClr val="tx1"/>
-              </a:solidFill>
-            </a:endParaRPr>
-          </a:p>
-        </p:txBody>
-      </p:sp>
-      <p:sp>
-        <p:nvSpPr>
-          <p:cNvPr id="9" name="Rectangle 8">
-            <a:extLst>
-              <a:ext uri="{FF2B5EF4-FFF2-40B4-BE49-F238E27FC236}">
-                <a16:creationId xmlns:a16="http://schemas.microsoft.com/office/drawing/2014/main" id="{F50557A8-8943-F711-C854-1442083C28F3}"/>
-              </a:ext>
-            </a:extLst>
-          </p:cNvPr>
-          <p:cNvSpPr/>
+            <a:endParaRPr lang="en-US" dirty="0"/>
+          </a:p>
+        </p:txBody>
+      </p:sp>
+      <p:sp>
+        <p:nvSpPr>
+          <p:cNvPr id="5" name="TextBox 4">
+            <a:extLst>
+              <a:ext uri="{FF2B5EF4-FFF2-40B4-BE49-F238E27FC236}">
+                <a16:creationId xmlns:a16="http://schemas.microsoft.com/office/drawing/2014/main" id="{F3D10CCD-BEC7-6751-6196-79EB1BF03A72}"/>
+              </a:ext>
+            </a:extLst>
+          </p:cNvPr>
+          <p:cNvSpPr txBox="1"/>
           <p:nvPr/>
         </p:nvSpPr>
         <p:spPr>
           <a:xfrm>
-            <a:off x="2558980" y="1075172"/>
-            <a:ext cx="7074040" cy="5576837"/>
+            <a:off x="1315918" y="251488"/>
+            <a:ext cx="2544882" cy="369332"/>
           </a:xfrm>
           <a:prstGeom prst="rect">
             <a:avLst/>
           </a:prstGeom>
           <a:noFill/>
+        </p:spPr>
+        <p:txBody>
+          <a:bodyPr wrap="square" rtlCol="0">
+            <a:spAutoFit/>
+          </a:bodyPr>
+          <a:lstStyle/>
+          <a:p>
+            <a:r>
+              <a:rPr lang="en-US" dirty="0"/>
+              <a:t>App Component</a:t>
+            </a:r>
+          </a:p>
+        </p:txBody>
+      </p:sp>
+      <p:sp>
+        <p:nvSpPr>
+          <p:cNvPr id="6" name="Oval 5">
+            <a:extLst>
+              <a:ext uri="{FF2B5EF4-FFF2-40B4-BE49-F238E27FC236}">
+                <a16:creationId xmlns:a16="http://schemas.microsoft.com/office/drawing/2014/main" id="{F015B093-1B74-B3B4-D239-B5EF357E1C8D}"/>
+              </a:ext>
+            </a:extLst>
+          </p:cNvPr>
+          <p:cNvSpPr/>
+          <p:nvPr/>
+        </p:nvSpPr>
+        <p:spPr>
+          <a:xfrm>
+            <a:off x="85969" y="3096846"/>
+            <a:ext cx="898769" cy="664308"/>
+          </a:xfrm>
+          <a:prstGeom prst="ellipse">
+            <a:avLst/>
+          </a:prstGeom>
         </p:spPr>
         <p:style>
           <a:lnRef idx="2">
@@ -4377,178 +4318,39 @@
           <a:lstStyle/>
           <a:p>
             <a:pPr algn="ctr"/>
-            <a:endParaRPr lang="en-US" dirty="0"/>
-          </a:p>
-        </p:txBody>
-      </p:sp>
-      <p:sp>
-        <p:nvSpPr>
-          <p:cNvPr id="15" name="Rectangle 14">
-            <a:extLst>
-              <a:ext uri="{FF2B5EF4-FFF2-40B4-BE49-F238E27FC236}">
-                <a16:creationId xmlns:a16="http://schemas.microsoft.com/office/drawing/2014/main" id="{2F28C8CE-0641-4BDC-3993-118AA2F43F1D}"/>
-              </a:ext>
-            </a:extLst>
-          </p:cNvPr>
-          <p:cNvSpPr/>
-          <p:nvPr/>
-        </p:nvSpPr>
-        <p:spPr>
-          <a:xfrm>
-            <a:off x="242835" y="200966"/>
-            <a:ext cx="11706330" cy="874206"/>
-          </a:xfrm>
-          <a:prstGeom prst="rect">
-            <a:avLst/>
-          </a:prstGeom>
-          <a:noFill/>
-        </p:spPr>
-        <p:style>
-          <a:lnRef idx="2">
-            <a:schemeClr val="accent1">
-              <a:shade val="15000"/>
-            </a:schemeClr>
-          </a:lnRef>
-          <a:fillRef idx="1">
-            <a:schemeClr val="accent1"/>
-          </a:fillRef>
-          <a:effectRef idx="0">
-            <a:schemeClr val="accent1"/>
-          </a:effectRef>
-          <a:fontRef idx="minor">
-            <a:schemeClr val="lt1"/>
-          </a:fontRef>
-        </p:style>
-        <p:txBody>
-          <a:bodyPr rtlCol="0" anchor="ctr"/>
-          <a:lstStyle/>
-          <a:p>
-            <a:pPr algn="ctr"/>
-            <a:r>
-              <a:rPr lang="en-US" u="sng" dirty="0">
-                <a:solidFill>
-                  <a:schemeClr val="tx1"/>
-                </a:solidFill>
-              </a:rPr>
-              <a:t>Image Sharing</a:t>
-            </a:r>
-            <a:r>
-              <a:rPr lang="en-US" dirty="0">
-                <a:solidFill>
-                  <a:schemeClr val="tx1"/>
-                </a:solidFill>
-              </a:rPr>
-              <a:t>	Image Creation	Leaderboard	</a:t>
-            </a:r>
-          </a:p>
-        </p:txBody>
-      </p:sp>
-      <p:sp>
-        <p:nvSpPr>
-          <p:cNvPr id="10" name="Rectangle 9">
-            <a:extLst>
-              <a:ext uri="{FF2B5EF4-FFF2-40B4-BE49-F238E27FC236}">
-                <a16:creationId xmlns:a16="http://schemas.microsoft.com/office/drawing/2014/main" id="{85EF44FD-530A-4109-3FC9-143E496BCB7C}"/>
-              </a:ext>
-            </a:extLst>
-          </p:cNvPr>
-          <p:cNvSpPr/>
-          <p:nvPr/>
-        </p:nvSpPr>
-        <p:spPr>
-          <a:xfrm>
-            <a:off x="4022435" y="1457678"/>
-            <a:ext cx="4147127" cy="1948873"/>
-          </a:xfrm>
-          <a:prstGeom prst="rect">
-            <a:avLst/>
-          </a:prstGeom>
-        </p:spPr>
-        <p:style>
-          <a:lnRef idx="2">
-            <a:schemeClr val="accent1">
-              <a:shade val="15000"/>
-            </a:schemeClr>
-          </a:lnRef>
-          <a:fillRef idx="1">
-            <a:schemeClr val="accent1"/>
-          </a:fillRef>
-          <a:effectRef idx="0">
-            <a:schemeClr val="accent1"/>
-          </a:effectRef>
-          <a:fontRef idx="minor">
-            <a:schemeClr val="lt1"/>
-          </a:fontRef>
-        </p:style>
-        <p:txBody>
-          <a:bodyPr rtlCol="0" anchor="ctr"/>
-          <a:lstStyle/>
-          <a:p>
-            <a:pPr algn="ctr"/>
             <a:r>
               <a:rPr lang="en-US" dirty="0"/>
-              <a:t>Image</a:t>
-            </a:r>
-          </a:p>
-        </p:txBody>
-      </p:sp>
-      <p:sp>
-        <p:nvSpPr>
-          <p:cNvPr id="14" name="TextBox 13">
-            <a:extLst>
-              <a:ext uri="{FF2B5EF4-FFF2-40B4-BE49-F238E27FC236}">
-                <a16:creationId xmlns:a16="http://schemas.microsoft.com/office/drawing/2014/main" id="{230198D7-353C-BDF5-291F-E564D880F45B}"/>
-              </a:ext>
-            </a:extLst>
-          </p:cNvPr>
-          <p:cNvSpPr txBox="1"/>
-          <p:nvPr/>
-        </p:nvSpPr>
-        <p:spPr>
-          <a:xfrm>
-            <a:off x="4022435" y="1093629"/>
-            <a:ext cx="4147127" cy="369332"/>
-          </a:xfrm>
-          <a:prstGeom prst="rect">
-            <a:avLst/>
-          </a:prstGeom>
-          <a:noFill/>
-        </p:spPr>
-        <p:txBody>
-          <a:bodyPr wrap="square" rtlCol="0">
-            <a:spAutoFit/>
-          </a:bodyPr>
-          <a:lstStyle/>
-          <a:p>
-            <a:r>
-              <a:rPr lang="en-US" dirty="0"/>
-              <a:t>Posted By: User1234</a:t>
+              <a:t>User</a:t>
             </a:r>
           </a:p>
         </p:txBody>
       </p:sp>
       <p:cxnSp>
         <p:nvCxnSpPr>
-          <p:cNvPr id="23" name="Straight Connector 22">
-            <a:extLst>
-              <a:ext uri="{FF2B5EF4-FFF2-40B4-BE49-F238E27FC236}">
-                <a16:creationId xmlns:a16="http://schemas.microsoft.com/office/drawing/2014/main" id="{497C4309-D6BC-5084-B49B-7972399D1500}"/>
+          <p:cNvPr id="8" name="Straight Arrow Connector 7">
+            <a:extLst>
+              <a:ext uri="{FF2B5EF4-FFF2-40B4-BE49-F238E27FC236}">
+                <a16:creationId xmlns:a16="http://schemas.microsoft.com/office/drawing/2014/main" id="{CFC7D765-C9B0-D895-21D4-AE452CB398D4}"/>
               </a:ext>
             </a:extLst>
           </p:cNvPr>
           <p:cNvCxnSpPr>
-            <a:cxnSpLocks/>
+            <a:stCxn id="6" idx="6"/>
+            <a:endCxn id="4" idx="1"/>
           </p:cNvCxnSpPr>
           <p:nvPr/>
         </p:nvCxnSpPr>
         <p:spPr>
           <a:xfrm>
-            <a:off x="2558980" y="3641918"/>
-            <a:ext cx="7074040" cy="0"/>
-          </a:xfrm>
-          <a:prstGeom prst="line">
+            <a:off x="984738" y="3429000"/>
+            <a:ext cx="359507" cy="0"/>
+          </a:xfrm>
+          <a:prstGeom prst="straightConnector1">
             <a:avLst/>
           </a:prstGeom>
+          <a:ln>
+            <a:tailEnd type="triangle"/>
+          </a:ln>
         </p:spPr>
         <p:style>
           <a:lnRef idx="1">
@@ -4567,10 +4369,10 @@
       </p:cxnSp>
       <p:sp>
         <p:nvSpPr>
-          <p:cNvPr id="27" name="Rectangle 26">
-            <a:extLst>
-              <a:ext uri="{FF2B5EF4-FFF2-40B4-BE49-F238E27FC236}">
-                <a16:creationId xmlns:a16="http://schemas.microsoft.com/office/drawing/2014/main" id="{D064D0C3-D346-E774-CC19-44A500101B6E}"/>
+          <p:cNvPr id="11" name="Rectangle: Rounded Corners 10">
+            <a:extLst>
+              <a:ext uri="{FF2B5EF4-FFF2-40B4-BE49-F238E27FC236}">
+                <a16:creationId xmlns:a16="http://schemas.microsoft.com/office/drawing/2014/main" id="{21487EA8-9C35-6CB5-8963-D24CDD47F8D7}"/>
               </a:ext>
             </a:extLst>
           </p:cNvPr>
@@ -4579,10 +4381,10 @@
         </p:nvSpPr>
         <p:spPr>
           <a:xfrm>
-            <a:off x="4022434" y="4009445"/>
-            <a:ext cx="4147127" cy="1948873"/>
-          </a:xfrm>
-          <a:prstGeom prst="rect">
+            <a:off x="3860800" y="748607"/>
+            <a:ext cx="1473196" cy="1086339"/>
+          </a:xfrm>
+          <a:prstGeom prst="roundRect">
             <a:avLst/>
           </a:prstGeom>
         </p:spPr>
@@ -4609,66 +4411,248 @@
             <a:pPr algn="ctr"/>
             <a:r>
               <a:rPr lang="en-US" dirty="0"/>
-              <a:t>Image</a:t>
-            </a:r>
-          </a:p>
-        </p:txBody>
-      </p:sp>
-      <p:sp>
-        <p:nvSpPr>
-          <p:cNvPr id="29" name="TextBox 28">
-            <a:extLst>
-              <a:ext uri="{FF2B5EF4-FFF2-40B4-BE49-F238E27FC236}">
-                <a16:creationId xmlns:a16="http://schemas.microsoft.com/office/drawing/2014/main" id="{173291B0-9515-88C1-FC0D-ABDFE61024F9}"/>
-              </a:ext>
-            </a:extLst>
-          </p:cNvPr>
-          <p:cNvSpPr txBox="1"/>
+              <a:t>Login Modal</a:t>
+            </a:r>
+          </a:p>
+        </p:txBody>
+      </p:sp>
+      <p:sp>
+        <p:nvSpPr>
+          <p:cNvPr id="12" name="Rectangle: Rounded Corners 11">
+            <a:extLst>
+              <a:ext uri="{FF2B5EF4-FFF2-40B4-BE49-F238E27FC236}">
+                <a16:creationId xmlns:a16="http://schemas.microsoft.com/office/drawing/2014/main" id="{CA48E134-A5B9-78A6-322E-8BADDA3750B1}"/>
+              </a:ext>
+            </a:extLst>
+          </p:cNvPr>
+          <p:cNvSpPr/>
           <p:nvPr/>
         </p:nvSpPr>
         <p:spPr>
           <a:xfrm>
-            <a:off x="4022434" y="3640113"/>
-            <a:ext cx="4147127" cy="369332"/>
-          </a:xfrm>
-          <a:prstGeom prst="rect">
+            <a:off x="3860800" y="4814720"/>
+            <a:ext cx="1496646" cy="1086339"/>
+          </a:xfrm>
+          <a:prstGeom prst="roundRect">
             <a:avLst/>
           </a:prstGeom>
-          <a:noFill/>
-        </p:spPr>
-        <p:txBody>
-          <a:bodyPr wrap="square" rtlCol="0">
-            <a:spAutoFit/>
-          </a:bodyPr>
-          <a:lstStyle/>
-          <a:p>
+        </p:spPr>
+        <p:style>
+          <a:lnRef idx="2">
+            <a:schemeClr val="accent1">
+              <a:shade val="15000"/>
+            </a:schemeClr>
+          </a:lnRef>
+          <a:fillRef idx="1">
+            <a:schemeClr val="accent1"/>
+          </a:fillRef>
+          <a:effectRef idx="0">
+            <a:schemeClr val="accent1"/>
+          </a:effectRef>
+          <a:fontRef idx="minor">
+            <a:schemeClr val="lt1"/>
+          </a:fontRef>
+        </p:style>
+        <p:txBody>
+          <a:bodyPr rtlCol="0" anchor="ctr"/>
+          <a:lstStyle/>
+          <a:p>
+            <a:pPr algn="ctr"/>
             <a:r>
               <a:rPr lang="en-US" dirty="0"/>
-              <a:t>Posted By: User5678</a:t>
+              <a:t>Image Creation</a:t>
+            </a:r>
+          </a:p>
+          <a:p>
+            <a:pPr algn="ctr"/>
+            <a:r>
+              <a:rPr lang="en-US" dirty="0"/>
+              <a:t>Component</a:t>
+            </a:r>
+          </a:p>
+        </p:txBody>
+      </p:sp>
+      <p:sp>
+        <p:nvSpPr>
+          <p:cNvPr id="13" name="Rectangle: Rounded Corners 12">
+            <a:extLst>
+              <a:ext uri="{FF2B5EF4-FFF2-40B4-BE49-F238E27FC236}">
+                <a16:creationId xmlns:a16="http://schemas.microsoft.com/office/drawing/2014/main" id="{63A49881-5435-172F-21F9-37DF2A351C06}"/>
+              </a:ext>
+            </a:extLst>
+          </p:cNvPr>
+          <p:cNvSpPr/>
+          <p:nvPr/>
+        </p:nvSpPr>
+        <p:spPr>
+          <a:xfrm>
+            <a:off x="3860801" y="3459349"/>
+            <a:ext cx="1496645" cy="1086339"/>
+          </a:xfrm>
+          <a:prstGeom prst="roundRect">
+            <a:avLst/>
+          </a:prstGeom>
+        </p:spPr>
+        <p:style>
+          <a:lnRef idx="2">
+            <a:schemeClr val="accent1">
+              <a:shade val="15000"/>
+            </a:schemeClr>
+          </a:lnRef>
+          <a:fillRef idx="1">
+            <a:schemeClr val="accent1"/>
+          </a:fillRef>
+          <a:effectRef idx="0">
+            <a:schemeClr val="accent1"/>
+          </a:effectRef>
+          <a:fontRef idx="minor">
+            <a:schemeClr val="lt1"/>
+          </a:fontRef>
+        </p:style>
+        <p:txBody>
+          <a:bodyPr rtlCol="0" anchor="ctr"/>
+          <a:lstStyle/>
+          <a:p>
+            <a:pPr algn="ctr"/>
+            <a:r>
+              <a:rPr lang="en-US" dirty="0"/>
+              <a:t>Image Sharing Component</a:t>
+            </a:r>
+          </a:p>
+        </p:txBody>
+      </p:sp>
+      <p:sp>
+        <p:nvSpPr>
+          <p:cNvPr id="14" name="Rectangle: Rounded Corners 13">
+            <a:extLst>
+              <a:ext uri="{FF2B5EF4-FFF2-40B4-BE49-F238E27FC236}">
+                <a16:creationId xmlns:a16="http://schemas.microsoft.com/office/drawing/2014/main" id="{15EFCCCC-5AC2-3779-C68F-CE6088AC50A5}"/>
+              </a:ext>
+            </a:extLst>
+          </p:cNvPr>
+          <p:cNvSpPr/>
+          <p:nvPr/>
+        </p:nvSpPr>
+        <p:spPr>
+          <a:xfrm>
+            <a:off x="3860800" y="2103978"/>
+            <a:ext cx="1496646" cy="1086339"/>
+          </a:xfrm>
+          <a:prstGeom prst="roundRect">
+            <a:avLst/>
+          </a:prstGeom>
+        </p:spPr>
+        <p:style>
+          <a:lnRef idx="2">
+            <a:schemeClr val="accent1">
+              <a:shade val="15000"/>
+            </a:schemeClr>
+          </a:lnRef>
+          <a:fillRef idx="1">
+            <a:schemeClr val="accent1"/>
+          </a:fillRef>
+          <a:effectRef idx="0">
+            <a:schemeClr val="accent1"/>
+          </a:effectRef>
+          <a:fontRef idx="minor">
+            <a:schemeClr val="lt1"/>
+          </a:fontRef>
+        </p:style>
+        <p:txBody>
+          <a:bodyPr rtlCol="0" anchor="ctr"/>
+          <a:lstStyle/>
+          <a:p>
+            <a:pPr algn="ctr"/>
+            <a:r>
+              <a:rPr lang="en-US" dirty="0"/>
+              <a:t>Leaderboard</a:t>
+            </a:r>
+          </a:p>
+          <a:p>
+            <a:pPr algn="ctr"/>
+            <a:r>
+              <a:rPr lang="en-US" dirty="0"/>
+              <a:t>Component</a:t>
+            </a:r>
+          </a:p>
+        </p:txBody>
+      </p:sp>
+      <p:sp>
+        <p:nvSpPr>
+          <p:cNvPr id="15" name="Rectangle: Rounded Corners 14">
+            <a:extLst>
+              <a:ext uri="{FF2B5EF4-FFF2-40B4-BE49-F238E27FC236}">
+                <a16:creationId xmlns:a16="http://schemas.microsoft.com/office/drawing/2014/main" id="{C8D4BDC0-B631-E4B9-65F8-2A83EC9B3E56}"/>
+              </a:ext>
+            </a:extLst>
+          </p:cNvPr>
+          <p:cNvSpPr/>
+          <p:nvPr/>
+        </p:nvSpPr>
+        <p:spPr>
+          <a:xfrm>
+            <a:off x="1486879" y="748607"/>
+            <a:ext cx="1496646" cy="5589668"/>
+          </a:xfrm>
+          <a:prstGeom prst="roundRect">
+            <a:avLst/>
+          </a:prstGeom>
+        </p:spPr>
+        <p:style>
+          <a:lnRef idx="2">
+            <a:schemeClr val="accent1">
+              <a:shade val="15000"/>
+            </a:schemeClr>
+          </a:lnRef>
+          <a:fillRef idx="1">
+            <a:schemeClr val="accent1"/>
+          </a:fillRef>
+          <a:effectRef idx="0">
+            <a:schemeClr val="accent1"/>
+          </a:effectRef>
+          <a:fontRef idx="minor">
+            <a:schemeClr val="lt1"/>
+          </a:fontRef>
+        </p:style>
+        <p:txBody>
+          <a:bodyPr rtlCol="0" anchor="ctr"/>
+          <a:lstStyle/>
+          <a:p>
+            <a:pPr algn="ctr"/>
+            <a:r>
+              <a:rPr lang="en-US" dirty="0"/>
+              <a:t>Navigation Bar Component</a:t>
             </a:r>
           </a:p>
         </p:txBody>
       </p:sp>
       <p:cxnSp>
         <p:nvCxnSpPr>
-          <p:cNvPr id="30" name="Straight Connector 29">
-            <a:extLst>
-              <a:ext uri="{FF2B5EF4-FFF2-40B4-BE49-F238E27FC236}">
-                <a16:creationId xmlns:a16="http://schemas.microsoft.com/office/drawing/2014/main" id="{BBC4014B-4E1F-FB5E-C5C2-50EB0BE10BAC}"/>
-              </a:ext>
-            </a:extLst>
-          </p:cNvPr>
-          <p:cNvCxnSpPr/>
+          <p:cNvPr id="16" name="Straight Arrow Connector 15">
+            <a:extLst>
+              <a:ext uri="{FF2B5EF4-FFF2-40B4-BE49-F238E27FC236}">
+                <a16:creationId xmlns:a16="http://schemas.microsoft.com/office/drawing/2014/main" id="{CD4795CF-5379-6DBC-EB22-16A18AD9C9C2}"/>
+              </a:ext>
+            </a:extLst>
+          </p:cNvPr>
+          <p:cNvCxnSpPr>
+            <a:cxnSpLocks/>
+            <a:stCxn id="15" idx="3"/>
+            <a:endCxn id="11" idx="1"/>
+          </p:cNvCxnSpPr>
           <p:nvPr/>
         </p:nvCxnSpPr>
         <p:spPr>
-          <a:xfrm>
-            <a:off x="2563599" y="6652010"/>
-            <a:ext cx="7074040" cy="0"/>
-          </a:xfrm>
-          <a:prstGeom prst="line">
+          <a:xfrm flipV="1">
+            <a:off x="2983525" y="1291777"/>
+            <a:ext cx="877275" cy="2251664"/>
+          </a:xfrm>
+          <a:prstGeom prst="straightConnector1">
             <a:avLst/>
           </a:prstGeom>
+          <a:ln>
+            <a:tailEnd type="triangle"/>
+          </a:ln>
         </p:spPr>
         <p:style>
           <a:lnRef idx="1">
@@ -4685,77 +4669,33 @@
           </a:fontRef>
         </p:style>
       </p:cxnSp>
-      <p:sp>
-        <p:nvSpPr>
-          <p:cNvPr id="31" name="Rectangle: Rounded Corners 30">
-            <a:extLst>
-              <a:ext uri="{FF2B5EF4-FFF2-40B4-BE49-F238E27FC236}">
-                <a16:creationId xmlns:a16="http://schemas.microsoft.com/office/drawing/2014/main" id="{A64B17D0-F6E3-8952-7582-8E8820143122}"/>
-              </a:ext>
-            </a:extLst>
-          </p:cNvPr>
-          <p:cNvSpPr/>
-          <p:nvPr/>
-        </p:nvSpPr>
-        <p:spPr>
-          <a:xfrm>
-            <a:off x="10009415" y="439613"/>
-            <a:ext cx="1797398" cy="462854"/>
-          </a:xfrm>
-          <a:prstGeom prst="roundRect">
-            <a:avLst/>
-          </a:prstGeom>
-        </p:spPr>
-        <p:style>
-          <a:lnRef idx="2">
-            <a:schemeClr val="accent1">
-              <a:shade val="15000"/>
-            </a:schemeClr>
-          </a:lnRef>
-          <a:fillRef idx="1">
-            <a:schemeClr val="accent1"/>
-          </a:fillRef>
-          <a:effectRef idx="0">
-            <a:schemeClr val="accent1"/>
-          </a:effectRef>
-          <a:fontRef idx="minor">
-            <a:schemeClr val="lt1"/>
-          </a:fontRef>
-        </p:style>
-        <p:txBody>
-          <a:bodyPr rtlCol="0" anchor="ctr"/>
-          <a:lstStyle/>
-          <a:p>
-            <a:pPr algn="ctr"/>
-            <a:r>
-              <a:rPr lang="en-US" dirty="0"/>
-              <a:t>Login</a:t>
-            </a:r>
-          </a:p>
-        </p:txBody>
-      </p:sp>
       <p:cxnSp>
         <p:nvCxnSpPr>
-          <p:cNvPr id="32" name="Straight Connector 31">
-            <a:extLst>
-              <a:ext uri="{FF2B5EF4-FFF2-40B4-BE49-F238E27FC236}">
-                <a16:creationId xmlns:a16="http://schemas.microsoft.com/office/drawing/2014/main" id="{342AFDF6-E4FC-DB3B-DFC3-A3056625D989}"/>
+          <p:cNvPr id="20" name="Straight Arrow Connector 19">
+            <a:extLst>
+              <a:ext uri="{FF2B5EF4-FFF2-40B4-BE49-F238E27FC236}">
+                <a16:creationId xmlns:a16="http://schemas.microsoft.com/office/drawing/2014/main" id="{65EAA5F5-29C5-4FBE-951C-627AE4A25D18}"/>
               </a:ext>
             </a:extLst>
           </p:cNvPr>
           <p:cNvCxnSpPr>
             <a:cxnSpLocks/>
+            <a:stCxn id="15" idx="3"/>
+            <a:endCxn id="14" idx="1"/>
           </p:cNvCxnSpPr>
           <p:nvPr/>
         </p:nvCxnSpPr>
         <p:spPr>
-          <a:xfrm>
-            <a:off x="2558980" y="6223482"/>
-            <a:ext cx="7074040" cy="0"/>
-          </a:xfrm>
-          <a:prstGeom prst="line">
+          <a:xfrm flipV="1">
+            <a:off x="2983525" y="2647148"/>
+            <a:ext cx="877275" cy="896293"/>
+          </a:xfrm>
+          <a:prstGeom prst="straightConnector1">
             <a:avLst/>
           </a:prstGeom>
+          <a:ln>
+            <a:tailEnd type="triangle"/>
+          </a:ln>
         </p:spPr>
         <p:style>
           <a:lnRef idx="1">
@@ -4772,50 +4712,463 @@
           </a:fontRef>
         </p:style>
       </p:cxnSp>
-      <p:sp>
-        <p:nvSpPr>
-          <p:cNvPr id="34" name="TextBox 33">
-            <a:extLst>
-              <a:ext uri="{FF2B5EF4-FFF2-40B4-BE49-F238E27FC236}">
-                <a16:creationId xmlns:a16="http://schemas.microsoft.com/office/drawing/2014/main" id="{DCB26481-07EB-F33A-7A0E-ADF408E47174}"/>
-              </a:ext>
-            </a:extLst>
-          </p:cNvPr>
-          <p:cNvSpPr txBox="1"/>
+      <p:cxnSp>
+        <p:nvCxnSpPr>
+          <p:cNvPr id="23" name="Straight Arrow Connector 22">
+            <a:extLst>
+              <a:ext uri="{FF2B5EF4-FFF2-40B4-BE49-F238E27FC236}">
+                <a16:creationId xmlns:a16="http://schemas.microsoft.com/office/drawing/2014/main" id="{8F49BCE7-3ACB-035C-C955-A82561E2D486}"/>
+              </a:ext>
+            </a:extLst>
+          </p:cNvPr>
+          <p:cNvCxnSpPr>
+            <a:cxnSpLocks/>
+            <a:stCxn id="13" idx="3"/>
+            <a:endCxn id="30" idx="1"/>
+          </p:cNvCxnSpPr>
           <p:nvPr/>
-        </p:nvSpPr>
-        <p:spPr>
-          <a:xfrm>
-            <a:off x="4022434" y="6252397"/>
-            <a:ext cx="4147127" cy="369332"/>
-          </a:xfrm>
-          <a:prstGeom prst="rect">
+        </p:nvCxnSpPr>
+        <p:spPr>
+          <a:xfrm>
+            <a:off x="5357446" y="4002519"/>
+            <a:ext cx="758088" cy="277446"/>
+          </a:xfrm>
+          <a:prstGeom prst="straightConnector1">
             <a:avLst/>
           </a:prstGeom>
-          <a:noFill/>
-        </p:spPr>
-        <p:txBody>
-          <a:bodyPr wrap="square" rtlCol="0">
-            <a:spAutoFit/>
-          </a:bodyPr>
-          <a:lstStyle/>
-          <a:p>
+          <a:ln>
+            <a:tailEnd type="triangle"/>
+          </a:ln>
+        </p:spPr>
+        <p:style>
+          <a:lnRef idx="1">
+            <a:schemeClr val="dk1"/>
+          </a:lnRef>
+          <a:fillRef idx="0">
+            <a:schemeClr val="dk1"/>
+          </a:fillRef>
+          <a:effectRef idx="0">
+            <a:schemeClr val="dk1"/>
+          </a:effectRef>
+          <a:fontRef idx="minor">
+            <a:schemeClr val="tx1"/>
+          </a:fontRef>
+        </p:style>
+      </p:cxnSp>
+      <p:cxnSp>
+        <p:nvCxnSpPr>
+          <p:cNvPr id="26" name="Straight Arrow Connector 25">
+            <a:extLst>
+              <a:ext uri="{FF2B5EF4-FFF2-40B4-BE49-F238E27FC236}">
+                <a16:creationId xmlns:a16="http://schemas.microsoft.com/office/drawing/2014/main" id="{B6B393B1-2DE7-611C-A221-255E1101E619}"/>
+              </a:ext>
+            </a:extLst>
+          </p:cNvPr>
+          <p:cNvCxnSpPr>
+            <a:cxnSpLocks/>
+            <a:stCxn id="15" idx="3"/>
+            <a:endCxn id="12" idx="1"/>
+          </p:cNvCxnSpPr>
+          <p:nvPr/>
+        </p:nvCxnSpPr>
+        <p:spPr>
+          <a:xfrm>
+            <a:off x="2983525" y="3543441"/>
+            <a:ext cx="877275" cy="1814449"/>
+          </a:xfrm>
+          <a:prstGeom prst="straightConnector1">
+            <a:avLst/>
+          </a:prstGeom>
+          <a:ln>
+            <a:tailEnd type="triangle"/>
+          </a:ln>
+        </p:spPr>
+        <p:style>
+          <a:lnRef idx="1">
+            <a:schemeClr val="dk1"/>
+          </a:lnRef>
+          <a:fillRef idx="0">
+            <a:schemeClr val="dk1"/>
+          </a:fillRef>
+          <a:effectRef idx="0">
+            <a:schemeClr val="dk1"/>
+          </a:effectRef>
+          <a:fontRef idx="minor">
+            <a:schemeClr val="tx1"/>
+          </a:fontRef>
+        </p:style>
+      </p:cxnSp>
+      <p:sp>
+        <p:nvSpPr>
+          <p:cNvPr id="29" name="Rectangle: Rounded Corners 28">
+            <a:extLst>
+              <a:ext uri="{FF2B5EF4-FFF2-40B4-BE49-F238E27FC236}">
+                <a16:creationId xmlns:a16="http://schemas.microsoft.com/office/drawing/2014/main" id="{A91D3174-E794-DFD8-9116-6618CE5B2ADD}"/>
+              </a:ext>
+            </a:extLst>
+          </p:cNvPr>
+          <p:cNvSpPr/>
+          <p:nvPr/>
+        </p:nvSpPr>
+        <p:spPr>
+          <a:xfrm>
+            <a:off x="6115534" y="3308789"/>
+            <a:ext cx="1770189" cy="606720"/>
+          </a:xfrm>
+          <a:prstGeom prst="roundRect">
+            <a:avLst/>
+          </a:prstGeom>
+        </p:spPr>
+        <p:style>
+          <a:lnRef idx="2">
+            <a:schemeClr val="accent1">
+              <a:shade val="15000"/>
+            </a:schemeClr>
+          </a:lnRef>
+          <a:fillRef idx="1">
+            <a:schemeClr val="accent1"/>
+          </a:fillRef>
+          <a:effectRef idx="0">
+            <a:schemeClr val="accent1"/>
+          </a:effectRef>
+          <a:fontRef idx="minor">
+            <a:schemeClr val="lt1"/>
+          </a:fontRef>
+        </p:style>
+        <p:txBody>
+          <a:bodyPr rtlCol="0" anchor="ctr"/>
+          <a:lstStyle/>
+          <a:p>
+            <a:pPr algn="ctr"/>
             <a:r>
               <a:rPr lang="en-US" dirty="0"/>
-              <a:t>Posted By: </a:t>
-            </a:r>
-            <a:r>
-              <a:rPr lang="en-US" dirty="0" err="1"/>
-              <a:t>UserABCD</a:t>
-            </a:r>
-            <a:endParaRPr lang="en-US" dirty="0"/>
-          </a:p>
-        </p:txBody>
-      </p:sp>
+              <a:t>Share Image Modal</a:t>
+            </a:r>
+          </a:p>
+        </p:txBody>
+      </p:sp>
+      <p:sp>
+        <p:nvSpPr>
+          <p:cNvPr id="30" name="Rectangle: Rounded Corners 29">
+            <a:extLst>
+              <a:ext uri="{FF2B5EF4-FFF2-40B4-BE49-F238E27FC236}">
+                <a16:creationId xmlns:a16="http://schemas.microsoft.com/office/drawing/2014/main" id="{D8027114-75F4-3925-796F-934CD8F8C49F}"/>
+              </a:ext>
+            </a:extLst>
+          </p:cNvPr>
+          <p:cNvSpPr/>
+          <p:nvPr/>
+        </p:nvSpPr>
+        <p:spPr>
+          <a:xfrm>
+            <a:off x="6115534" y="4014241"/>
+            <a:ext cx="1770189" cy="531447"/>
+          </a:xfrm>
+          <a:prstGeom prst="roundRect">
+            <a:avLst/>
+          </a:prstGeom>
+        </p:spPr>
+        <p:style>
+          <a:lnRef idx="2">
+            <a:schemeClr val="accent1">
+              <a:shade val="15000"/>
+            </a:schemeClr>
+          </a:lnRef>
+          <a:fillRef idx="1">
+            <a:schemeClr val="accent1"/>
+          </a:fillRef>
+          <a:effectRef idx="0">
+            <a:schemeClr val="accent1"/>
+          </a:effectRef>
+          <a:fontRef idx="minor">
+            <a:schemeClr val="lt1"/>
+          </a:fontRef>
+        </p:style>
+        <p:txBody>
+          <a:bodyPr rtlCol="0" anchor="ctr"/>
+          <a:lstStyle/>
+          <a:p>
+            <a:pPr algn="ctr"/>
+            <a:r>
+              <a:rPr lang="en-US" dirty="0"/>
+              <a:t>[Posted Image Component]</a:t>
+            </a:r>
+          </a:p>
+        </p:txBody>
+      </p:sp>
+      <p:cxnSp>
+        <p:nvCxnSpPr>
+          <p:cNvPr id="32" name="Straight Arrow Connector 31">
+            <a:extLst>
+              <a:ext uri="{FF2B5EF4-FFF2-40B4-BE49-F238E27FC236}">
+                <a16:creationId xmlns:a16="http://schemas.microsoft.com/office/drawing/2014/main" id="{90443F0E-5B95-F62C-5DBD-01EDC17C6936}"/>
+              </a:ext>
+            </a:extLst>
+          </p:cNvPr>
+          <p:cNvCxnSpPr>
+            <a:cxnSpLocks/>
+            <a:stCxn id="13" idx="3"/>
+            <a:endCxn id="29" idx="1"/>
+          </p:cNvCxnSpPr>
+          <p:nvPr/>
+        </p:nvCxnSpPr>
+        <p:spPr>
+          <a:xfrm flipV="1">
+            <a:off x="5357446" y="3612149"/>
+            <a:ext cx="758088" cy="390370"/>
+          </a:xfrm>
+          <a:prstGeom prst="straightConnector1">
+            <a:avLst/>
+          </a:prstGeom>
+          <a:ln>
+            <a:tailEnd type="triangle"/>
+          </a:ln>
+        </p:spPr>
+        <p:style>
+          <a:lnRef idx="1">
+            <a:schemeClr val="dk1"/>
+          </a:lnRef>
+          <a:fillRef idx="0">
+            <a:schemeClr val="dk1"/>
+          </a:fillRef>
+          <a:effectRef idx="0">
+            <a:schemeClr val="dk1"/>
+          </a:effectRef>
+          <a:fontRef idx="minor">
+            <a:schemeClr val="tx1"/>
+          </a:fontRef>
+        </p:style>
+      </p:cxnSp>
+      <p:cxnSp>
+        <p:nvCxnSpPr>
+          <p:cNvPr id="37" name="Straight Arrow Connector 36">
+            <a:extLst>
+              <a:ext uri="{FF2B5EF4-FFF2-40B4-BE49-F238E27FC236}">
+                <a16:creationId xmlns:a16="http://schemas.microsoft.com/office/drawing/2014/main" id="{765D1441-FB5E-0B80-6F61-F5FC86ECB5E4}"/>
+              </a:ext>
+            </a:extLst>
+          </p:cNvPr>
+          <p:cNvCxnSpPr>
+            <a:cxnSpLocks/>
+            <a:stCxn id="15" idx="3"/>
+            <a:endCxn id="13" idx="1"/>
+          </p:cNvCxnSpPr>
+          <p:nvPr/>
+        </p:nvCxnSpPr>
+        <p:spPr>
+          <a:xfrm>
+            <a:off x="2983525" y="3543441"/>
+            <a:ext cx="877276" cy="459078"/>
+          </a:xfrm>
+          <a:prstGeom prst="straightConnector1">
+            <a:avLst/>
+          </a:prstGeom>
+          <a:ln>
+            <a:tailEnd type="triangle"/>
+          </a:ln>
+        </p:spPr>
+        <p:style>
+          <a:lnRef idx="1">
+            <a:schemeClr val="dk1"/>
+          </a:lnRef>
+          <a:fillRef idx="0">
+            <a:schemeClr val="dk1"/>
+          </a:fillRef>
+          <a:effectRef idx="0">
+            <a:schemeClr val="dk1"/>
+          </a:effectRef>
+          <a:fontRef idx="minor">
+            <a:schemeClr val="tx1"/>
+          </a:fontRef>
+        </p:style>
+      </p:cxnSp>
+      <p:cxnSp>
+        <p:nvCxnSpPr>
+          <p:cNvPr id="40" name="Straight Arrow Connector 39">
+            <a:extLst>
+              <a:ext uri="{FF2B5EF4-FFF2-40B4-BE49-F238E27FC236}">
+                <a16:creationId xmlns:a16="http://schemas.microsoft.com/office/drawing/2014/main" id="{B7BBAE0E-6FD4-EB59-5863-54ED6EF50FDE}"/>
+              </a:ext>
+            </a:extLst>
+          </p:cNvPr>
+          <p:cNvCxnSpPr>
+            <a:cxnSpLocks/>
+            <a:endCxn id="42" idx="1"/>
+          </p:cNvCxnSpPr>
+          <p:nvPr/>
+        </p:nvCxnSpPr>
+        <p:spPr>
+          <a:xfrm>
+            <a:off x="5385773" y="5410839"/>
+            <a:ext cx="710227" cy="218635"/>
+          </a:xfrm>
+          <a:prstGeom prst="straightConnector1">
+            <a:avLst/>
+          </a:prstGeom>
+          <a:ln>
+            <a:tailEnd type="triangle"/>
+          </a:ln>
+        </p:spPr>
+        <p:style>
+          <a:lnRef idx="1">
+            <a:schemeClr val="dk1"/>
+          </a:lnRef>
+          <a:fillRef idx="0">
+            <a:schemeClr val="dk1"/>
+          </a:fillRef>
+          <a:effectRef idx="0">
+            <a:schemeClr val="dk1"/>
+          </a:effectRef>
+          <a:fontRef idx="minor">
+            <a:schemeClr val="tx1"/>
+          </a:fontRef>
+        </p:style>
+      </p:cxnSp>
+      <p:sp>
+        <p:nvSpPr>
+          <p:cNvPr id="41" name="Rectangle: Rounded Corners 40">
+            <a:extLst>
+              <a:ext uri="{FF2B5EF4-FFF2-40B4-BE49-F238E27FC236}">
+                <a16:creationId xmlns:a16="http://schemas.microsoft.com/office/drawing/2014/main" id="{1B40FF21-CAB8-489B-7555-3100FE0FC66B}"/>
+              </a:ext>
+            </a:extLst>
+          </p:cNvPr>
+          <p:cNvSpPr/>
+          <p:nvPr/>
+        </p:nvSpPr>
+        <p:spPr>
+          <a:xfrm>
+            <a:off x="6096000" y="4715987"/>
+            <a:ext cx="1789723" cy="543170"/>
+          </a:xfrm>
+          <a:prstGeom prst="roundRect">
+            <a:avLst/>
+          </a:prstGeom>
+        </p:spPr>
+        <p:style>
+          <a:lnRef idx="2">
+            <a:schemeClr val="accent1">
+              <a:shade val="15000"/>
+            </a:schemeClr>
+          </a:lnRef>
+          <a:fillRef idx="1">
+            <a:schemeClr val="accent1"/>
+          </a:fillRef>
+          <a:effectRef idx="0">
+            <a:schemeClr val="accent1"/>
+          </a:effectRef>
+          <a:fontRef idx="minor">
+            <a:schemeClr val="lt1"/>
+          </a:fontRef>
+        </p:style>
+        <p:txBody>
+          <a:bodyPr rtlCol="0" anchor="ctr"/>
+          <a:lstStyle/>
+          <a:p>
+            <a:pPr algn="ctr"/>
+            <a:r>
+              <a:rPr lang="en-US" dirty="0"/>
+              <a:t>Create Image Modal</a:t>
+            </a:r>
+          </a:p>
+        </p:txBody>
+      </p:sp>
+      <p:sp>
+        <p:nvSpPr>
+          <p:cNvPr id="42" name="Rectangle: Rounded Corners 41">
+            <a:extLst>
+              <a:ext uri="{FF2B5EF4-FFF2-40B4-BE49-F238E27FC236}">
+                <a16:creationId xmlns:a16="http://schemas.microsoft.com/office/drawing/2014/main" id="{0EBE69D3-C6D3-49EB-31B4-A89D9384A01A}"/>
+              </a:ext>
+            </a:extLst>
+          </p:cNvPr>
+          <p:cNvSpPr/>
+          <p:nvPr/>
+        </p:nvSpPr>
+        <p:spPr>
+          <a:xfrm>
+            <a:off x="6096000" y="5357889"/>
+            <a:ext cx="1789723" cy="543170"/>
+          </a:xfrm>
+          <a:prstGeom prst="roundRect">
+            <a:avLst/>
+          </a:prstGeom>
+        </p:spPr>
+        <p:style>
+          <a:lnRef idx="2">
+            <a:schemeClr val="accent1">
+              <a:shade val="15000"/>
+            </a:schemeClr>
+          </a:lnRef>
+          <a:fillRef idx="1">
+            <a:schemeClr val="accent1"/>
+          </a:fillRef>
+          <a:effectRef idx="0">
+            <a:schemeClr val="accent1"/>
+          </a:effectRef>
+          <a:fontRef idx="minor">
+            <a:schemeClr val="lt1"/>
+          </a:fontRef>
+        </p:style>
+        <p:txBody>
+          <a:bodyPr rtlCol="0" anchor="ctr"/>
+          <a:lstStyle/>
+          <a:p>
+            <a:pPr algn="ctr"/>
+            <a:r>
+              <a:rPr lang="en-US" dirty="0"/>
+              <a:t>[Created Image Component]</a:t>
+            </a:r>
+          </a:p>
+        </p:txBody>
+      </p:sp>
+      <p:cxnSp>
+        <p:nvCxnSpPr>
+          <p:cNvPr id="43" name="Straight Arrow Connector 42">
+            <a:extLst>
+              <a:ext uri="{FF2B5EF4-FFF2-40B4-BE49-F238E27FC236}">
+                <a16:creationId xmlns:a16="http://schemas.microsoft.com/office/drawing/2014/main" id="{64C76B03-E9E8-852A-995C-ABB9FD7FB657}"/>
+              </a:ext>
+            </a:extLst>
+          </p:cNvPr>
+          <p:cNvCxnSpPr>
+            <a:cxnSpLocks/>
+            <a:stCxn id="12" idx="3"/>
+            <a:endCxn id="41" idx="1"/>
+          </p:cNvCxnSpPr>
+          <p:nvPr/>
+        </p:nvCxnSpPr>
+        <p:spPr>
+          <a:xfrm flipV="1">
+            <a:off x="5357446" y="4987572"/>
+            <a:ext cx="738554" cy="370318"/>
+          </a:xfrm>
+          <a:prstGeom prst="straightConnector1">
+            <a:avLst/>
+          </a:prstGeom>
+          <a:ln>
+            <a:tailEnd type="triangle"/>
+          </a:ln>
+        </p:spPr>
+        <p:style>
+          <a:lnRef idx="1">
+            <a:schemeClr val="dk1"/>
+          </a:lnRef>
+          <a:fillRef idx="0">
+            <a:schemeClr val="dk1"/>
+          </a:fillRef>
+          <a:effectRef idx="0">
+            <a:schemeClr val="dk1"/>
+          </a:effectRef>
+          <a:fontRef idx="minor">
+            <a:schemeClr val="tx1"/>
+          </a:fontRef>
+        </p:style>
+      </p:cxnSp>
     </p:spTree>
     <p:extLst>
       <p:ext uri="{BB962C8B-B14F-4D97-AF65-F5344CB8AC3E}">
-        <p14:creationId xmlns:p14="http://schemas.microsoft.com/office/powerpoint/2010/main" val="2881041793"/>
+        <p14:creationId xmlns:p14="http://schemas.microsoft.com/office/powerpoint/2010/main" val="1457382816"/>
       </p:ext>
     </p:extLst>
   </p:cSld>
@@ -4862,7 +5215,9 @@
           <a:prstGeom prst="rect">
             <a:avLst/>
           </a:prstGeom>
-          <a:noFill/>
+          <a:solidFill>
+            <a:schemeClr val="bg1"/>
+          </a:solidFill>
         </p:spPr>
         <p:style>
           <a:lnRef idx="2">
@@ -4885,16 +5240,20 @@
           <a:lstStyle/>
           <a:p>
             <a:pPr algn="ctr"/>
-            <a:endParaRPr lang="en-US" dirty="0"/>
-          </a:p>
-        </p:txBody>
-      </p:sp>
-      <p:sp>
-        <p:nvSpPr>
-          <p:cNvPr id="14" name="Rectangle: Rounded Corners 13">
-            <a:extLst>
-              <a:ext uri="{FF2B5EF4-FFF2-40B4-BE49-F238E27FC236}">
-                <a16:creationId xmlns:a16="http://schemas.microsoft.com/office/drawing/2014/main" id="{462EB88B-18C0-73B8-1596-E8B79A8C25FF}"/>
+            <a:endParaRPr lang="en-US" dirty="0">
+              <a:solidFill>
+                <a:schemeClr val="tx1"/>
+              </a:solidFill>
+            </a:endParaRPr>
+          </a:p>
+        </p:txBody>
+      </p:sp>
+      <p:sp>
+        <p:nvSpPr>
+          <p:cNvPr id="9" name="Rectangle 8">
+            <a:extLst>
+              <a:ext uri="{FF2B5EF4-FFF2-40B4-BE49-F238E27FC236}">
+                <a16:creationId xmlns:a16="http://schemas.microsoft.com/office/drawing/2014/main" id="{F50557A8-8943-F711-C854-1442083C28F3}"/>
               </a:ext>
             </a:extLst>
           </p:cNvPr>
@@ -4903,12 +5262,13 @@
         </p:nvSpPr>
         <p:spPr>
           <a:xfrm>
-            <a:off x="3543079" y="3523220"/>
-            <a:ext cx="5274128" cy="923331"/>
-          </a:xfrm>
-          <a:prstGeom prst="roundRect">
+            <a:off x="2558980" y="1075172"/>
+            <a:ext cx="7074040" cy="5576837"/>
+          </a:xfrm>
+          <a:prstGeom prst="rect">
             <a:avLst/>
           </a:prstGeom>
+          <a:noFill/>
         </p:spPr>
         <p:style>
           <a:lnRef idx="2">
@@ -4931,10 +5291,7 @@
           <a:lstStyle/>
           <a:p>
             <a:pPr algn="ctr"/>
-            <a:r>
-              <a:rPr lang="en-US" dirty="0"/>
-              <a:t>Login</a:t>
-            </a:r>
+            <a:endParaRPr lang="en-US" dirty="0"/>
           </a:p>
         </p:txBody>
       </p:sp>
@@ -4981,64 +5338,31 @@
           <a:lstStyle/>
           <a:p>
             <a:pPr algn="ctr"/>
-            <a:endParaRPr lang="en-US" dirty="0">
-              <a:solidFill>
-                <a:schemeClr val="tx1"/>
-              </a:solidFill>
-            </a:endParaRPr>
-          </a:p>
-        </p:txBody>
-      </p:sp>
-      <p:sp>
-        <p:nvSpPr>
-          <p:cNvPr id="5" name="TextBox 4">
-            <a:extLst>
-              <a:ext uri="{FF2B5EF4-FFF2-40B4-BE49-F238E27FC236}">
-                <a16:creationId xmlns:a16="http://schemas.microsoft.com/office/drawing/2014/main" id="{474717AD-CE4F-D03C-3A7B-1D8EC78F21DD}"/>
-              </a:ext>
-            </a:extLst>
-          </p:cNvPr>
-          <p:cNvSpPr txBox="1"/>
-          <p:nvPr/>
-        </p:nvSpPr>
-        <p:spPr>
-          <a:xfrm>
-            <a:off x="783550" y="2241095"/>
-            <a:ext cx="10793186" cy="923330"/>
-          </a:xfrm>
-          <a:prstGeom prst="rect">
-            <a:avLst/>
-          </a:prstGeom>
-          <a:noFill/>
-        </p:spPr>
-        <p:txBody>
-          <a:bodyPr wrap="square" rtlCol="0">
-            <a:spAutoFit/>
-          </a:bodyPr>
-          <a:lstStyle/>
-          <a:p>
-            <a:r>
-              <a:rPr lang="en-US" dirty="0"/>
-              <a:t>Username :  __________________________________________________________________________________</a:t>
-            </a:r>
-          </a:p>
-          <a:p>
-            <a:endParaRPr lang="en-US" dirty="0"/>
-          </a:p>
-          <a:p>
-            <a:r>
-              <a:rPr lang="en-US" dirty="0"/>
-              <a:t>Password   :  __________________________________________________________________________________</a:t>
-            </a:r>
-          </a:p>
-        </p:txBody>
-      </p:sp>
-      <p:sp>
-        <p:nvSpPr>
-          <p:cNvPr id="6" name="Rectangle: Rounded Corners 5">
-            <a:extLst>
-              <a:ext uri="{FF2B5EF4-FFF2-40B4-BE49-F238E27FC236}">
-                <a16:creationId xmlns:a16="http://schemas.microsoft.com/office/drawing/2014/main" id="{07219D55-E805-DBD6-0895-0F877BBCCFCB}"/>
+            <a:r>
+              <a:rPr lang="en-US" u="sng" dirty="0">
+                <a:solidFill>
+                  <a:schemeClr val="tx1"/>
+                </a:solidFill>
+              </a:rPr>
+              <a:t>Image Sharing</a:t>
+            </a:r>
+            <a:r>
+              <a:rPr lang="en-US" dirty="0">
+                <a:solidFill>
+                  <a:schemeClr val="tx1"/>
+                </a:solidFill>
+              </a:rPr>
+              <a:t>	Image Creation	Leaderboard	</a:t>
+            </a:r>
+          </a:p>
+        </p:txBody>
+      </p:sp>
+      <p:sp>
+        <p:nvSpPr>
+          <p:cNvPr id="10" name="Rectangle 9">
+            <a:extLst>
+              <a:ext uri="{FF2B5EF4-FFF2-40B4-BE49-F238E27FC236}">
+                <a16:creationId xmlns:a16="http://schemas.microsoft.com/office/drawing/2014/main" id="{85EF44FD-530A-4109-3FC9-143E496BCB7C}"/>
               </a:ext>
             </a:extLst>
           </p:cNvPr>
@@ -5047,10 +5371,10 @@
         </p:nvSpPr>
         <p:spPr>
           <a:xfrm>
-            <a:off x="3543079" y="4699928"/>
-            <a:ext cx="5274128" cy="923331"/>
-          </a:xfrm>
-          <a:prstGeom prst="roundRect">
+            <a:off x="4022435" y="1457678"/>
+            <a:ext cx="4147127" cy="1948873"/>
+          </a:xfrm>
+          <a:prstGeom prst="rect">
             <a:avLst/>
           </a:prstGeom>
         </p:spPr>
@@ -5077,15 +5401,335 @@
             <a:pPr algn="ctr"/>
             <a:r>
               <a:rPr lang="en-US" dirty="0"/>
-              <a:t>Register</a:t>
-            </a:r>
+              <a:t>Image</a:t>
+            </a:r>
+          </a:p>
+        </p:txBody>
+      </p:sp>
+      <p:sp>
+        <p:nvSpPr>
+          <p:cNvPr id="14" name="TextBox 13">
+            <a:extLst>
+              <a:ext uri="{FF2B5EF4-FFF2-40B4-BE49-F238E27FC236}">
+                <a16:creationId xmlns:a16="http://schemas.microsoft.com/office/drawing/2014/main" id="{230198D7-353C-BDF5-291F-E564D880F45B}"/>
+              </a:ext>
+            </a:extLst>
+          </p:cNvPr>
+          <p:cNvSpPr txBox="1"/>
+          <p:nvPr/>
+        </p:nvSpPr>
+        <p:spPr>
+          <a:xfrm>
+            <a:off x="4022435" y="1093629"/>
+            <a:ext cx="4147127" cy="369332"/>
+          </a:xfrm>
+          <a:prstGeom prst="rect">
+            <a:avLst/>
+          </a:prstGeom>
+          <a:noFill/>
+        </p:spPr>
+        <p:txBody>
+          <a:bodyPr wrap="square" rtlCol="0">
+            <a:spAutoFit/>
+          </a:bodyPr>
+          <a:lstStyle/>
+          <a:p>
+            <a:r>
+              <a:rPr lang="en-US" dirty="0"/>
+              <a:t>Posted By: User1234</a:t>
+            </a:r>
+          </a:p>
+        </p:txBody>
+      </p:sp>
+      <p:cxnSp>
+        <p:nvCxnSpPr>
+          <p:cNvPr id="23" name="Straight Connector 22">
+            <a:extLst>
+              <a:ext uri="{FF2B5EF4-FFF2-40B4-BE49-F238E27FC236}">
+                <a16:creationId xmlns:a16="http://schemas.microsoft.com/office/drawing/2014/main" id="{497C4309-D6BC-5084-B49B-7972399D1500}"/>
+              </a:ext>
+            </a:extLst>
+          </p:cNvPr>
+          <p:cNvCxnSpPr>
+            <a:cxnSpLocks/>
+          </p:cNvCxnSpPr>
+          <p:nvPr/>
+        </p:nvCxnSpPr>
+        <p:spPr>
+          <a:xfrm>
+            <a:off x="2558980" y="3641918"/>
+            <a:ext cx="7074040" cy="0"/>
+          </a:xfrm>
+          <a:prstGeom prst="line">
+            <a:avLst/>
+          </a:prstGeom>
+        </p:spPr>
+        <p:style>
+          <a:lnRef idx="1">
+            <a:schemeClr val="dk1"/>
+          </a:lnRef>
+          <a:fillRef idx="0">
+            <a:schemeClr val="dk1"/>
+          </a:fillRef>
+          <a:effectRef idx="0">
+            <a:schemeClr val="dk1"/>
+          </a:effectRef>
+          <a:fontRef idx="minor">
+            <a:schemeClr val="tx1"/>
+          </a:fontRef>
+        </p:style>
+      </p:cxnSp>
+      <p:sp>
+        <p:nvSpPr>
+          <p:cNvPr id="27" name="Rectangle 26">
+            <a:extLst>
+              <a:ext uri="{FF2B5EF4-FFF2-40B4-BE49-F238E27FC236}">
+                <a16:creationId xmlns:a16="http://schemas.microsoft.com/office/drawing/2014/main" id="{D064D0C3-D346-E774-CC19-44A500101B6E}"/>
+              </a:ext>
+            </a:extLst>
+          </p:cNvPr>
+          <p:cNvSpPr/>
+          <p:nvPr/>
+        </p:nvSpPr>
+        <p:spPr>
+          <a:xfrm>
+            <a:off x="4022434" y="4009445"/>
+            <a:ext cx="4147127" cy="1948873"/>
+          </a:xfrm>
+          <a:prstGeom prst="rect">
+            <a:avLst/>
+          </a:prstGeom>
+        </p:spPr>
+        <p:style>
+          <a:lnRef idx="2">
+            <a:schemeClr val="accent1">
+              <a:shade val="15000"/>
+            </a:schemeClr>
+          </a:lnRef>
+          <a:fillRef idx="1">
+            <a:schemeClr val="accent1"/>
+          </a:fillRef>
+          <a:effectRef idx="0">
+            <a:schemeClr val="accent1"/>
+          </a:effectRef>
+          <a:fontRef idx="minor">
+            <a:schemeClr val="lt1"/>
+          </a:fontRef>
+        </p:style>
+        <p:txBody>
+          <a:bodyPr rtlCol="0" anchor="ctr"/>
+          <a:lstStyle/>
+          <a:p>
+            <a:pPr algn="ctr"/>
+            <a:r>
+              <a:rPr lang="en-US" dirty="0"/>
+              <a:t>Image</a:t>
+            </a:r>
+          </a:p>
+        </p:txBody>
+      </p:sp>
+      <p:sp>
+        <p:nvSpPr>
+          <p:cNvPr id="29" name="TextBox 28">
+            <a:extLst>
+              <a:ext uri="{FF2B5EF4-FFF2-40B4-BE49-F238E27FC236}">
+                <a16:creationId xmlns:a16="http://schemas.microsoft.com/office/drawing/2014/main" id="{173291B0-9515-88C1-FC0D-ABDFE61024F9}"/>
+              </a:ext>
+            </a:extLst>
+          </p:cNvPr>
+          <p:cNvSpPr txBox="1"/>
+          <p:nvPr/>
+        </p:nvSpPr>
+        <p:spPr>
+          <a:xfrm>
+            <a:off x="4022434" y="3640113"/>
+            <a:ext cx="4147127" cy="369332"/>
+          </a:xfrm>
+          <a:prstGeom prst="rect">
+            <a:avLst/>
+          </a:prstGeom>
+          <a:noFill/>
+        </p:spPr>
+        <p:txBody>
+          <a:bodyPr wrap="square" rtlCol="0">
+            <a:spAutoFit/>
+          </a:bodyPr>
+          <a:lstStyle/>
+          <a:p>
+            <a:r>
+              <a:rPr lang="en-US" dirty="0"/>
+              <a:t>Posted By: User5678</a:t>
+            </a:r>
+          </a:p>
+        </p:txBody>
+      </p:sp>
+      <p:cxnSp>
+        <p:nvCxnSpPr>
+          <p:cNvPr id="30" name="Straight Connector 29">
+            <a:extLst>
+              <a:ext uri="{FF2B5EF4-FFF2-40B4-BE49-F238E27FC236}">
+                <a16:creationId xmlns:a16="http://schemas.microsoft.com/office/drawing/2014/main" id="{BBC4014B-4E1F-FB5E-C5C2-50EB0BE10BAC}"/>
+              </a:ext>
+            </a:extLst>
+          </p:cNvPr>
+          <p:cNvCxnSpPr/>
+          <p:nvPr/>
+        </p:nvCxnSpPr>
+        <p:spPr>
+          <a:xfrm>
+            <a:off x="2563599" y="6652010"/>
+            <a:ext cx="7074040" cy="0"/>
+          </a:xfrm>
+          <a:prstGeom prst="line">
+            <a:avLst/>
+          </a:prstGeom>
+        </p:spPr>
+        <p:style>
+          <a:lnRef idx="1">
+            <a:schemeClr val="dk1"/>
+          </a:lnRef>
+          <a:fillRef idx="0">
+            <a:schemeClr val="dk1"/>
+          </a:fillRef>
+          <a:effectRef idx="0">
+            <a:schemeClr val="dk1"/>
+          </a:effectRef>
+          <a:fontRef idx="minor">
+            <a:schemeClr val="tx1"/>
+          </a:fontRef>
+        </p:style>
+      </p:cxnSp>
+      <p:sp>
+        <p:nvSpPr>
+          <p:cNvPr id="31" name="Rectangle: Rounded Corners 30">
+            <a:extLst>
+              <a:ext uri="{FF2B5EF4-FFF2-40B4-BE49-F238E27FC236}">
+                <a16:creationId xmlns:a16="http://schemas.microsoft.com/office/drawing/2014/main" id="{A64B17D0-F6E3-8952-7582-8E8820143122}"/>
+              </a:ext>
+            </a:extLst>
+          </p:cNvPr>
+          <p:cNvSpPr/>
+          <p:nvPr/>
+        </p:nvSpPr>
+        <p:spPr>
+          <a:xfrm>
+            <a:off x="10009415" y="439613"/>
+            <a:ext cx="1797398" cy="462854"/>
+          </a:xfrm>
+          <a:prstGeom prst="roundRect">
+            <a:avLst/>
+          </a:prstGeom>
+        </p:spPr>
+        <p:style>
+          <a:lnRef idx="2">
+            <a:schemeClr val="accent1">
+              <a:shade val="15000"/>
+            </a:schemeClr>
+          </a:lnRef>
+          <a:fillRef idx="1">
+            <a:schemeClr val="accent1"/>
+          </a:fillRef>
+          <a:effectRef idx="0">
+            <a:schemeClr val="accent1"/>
+          </a:effectRef>
+          <a:fontRef idx="minor">
+            <a:schemeClr val="lt1"/>
+          </a:fontRef>
+        </p:style>
+        <p:txBody>
+          <a:bodyPr rtlCol="0" anchor="ctr"/>
+          <a:lstStyle/>
+          <a:p>
+            <a:pPr algn="ctr"/>
+            <a:r>
+              <a:rPr lang="en-US" dirty="0"/>
+              <a:t>Login</a:t>
+            </a:r>
+          </a:p>
+        </p:txBody>
+      </p:sp>
+      <p:cxnSp>
+        <p:nvCxnSpPr>
+          <p:cNvPr id="32" name="Straight Connector 31">
+            <a:extLst>
+              <a:ext uri="{FF2B5EF4-FFF2-40B4-BE49-F238E27FC236}">
+                <a16:creationId xmlns:a16="http://schemas.microsoft.com/office/drawing/2014/main" id="{342AFDF6-E4FC-DB3B-DFC3-A3056625D989}"/>
+              </a:ext>
+            </a:extLst>
+          </p:cNvPr>
+          <p:cNvCxnSpPr>
+            <a:cxnSpLocks/>
+          </p:cNvCxnSpPr>
+          <p:nvPr/>
+        </p:nvCxnSpPr>
+        <p:spPr>
+          <a:xfrm>
+            <a:off x="2558980" y="6223482"/>
+            <a:ext cx="7074040" cy="0"/>
+          </a:xfrm>
+          <a:prstGeom prst="line">
+            <a:avLst/>
+          </a:prstGeom>
+        </p:spPr>
+        <p:style>
+          <a:lnRef idx="1">
+            <a:schemeClr val="dk1"/>
+          </a:lnRef>
+          <a:fillRef idx="0">
+            <a:schemeClr val="dk1"/>
+          </a:fillRef>
+          <a:effectRef idx="0">
+            <a:schemeClr val="dk1"/>
+          </a:effectRef>
+          <a:fontRef idx="minor">
+            <a:schemeClr val="tx1"/>
+          </a:fontRef>
+        </p:style>
+      </p:cxnSp>
+      <p:sp>
+        <p:nvSpPr>
+          <p:cNvPr id="34" name="TextBox 33">
+            <a:extLst>
+              <a:ext uri="{FF2B5EF4-FFF2-40B4-BE49-F238E27FC236}">
+                <a16:creationId xmlns:a16="http://schemas.microsoft.com/office/drawing/2014/main" id="{DCB26481-07EB-F33A-7A0E-ADF408E47174}"/>
+              </a:ext>
+            </a:extLst>
+          </p:cNvPr>
+          <p:cNvSpPr txBox="1"/>
+          <p:nvPr/>
+        </p:nvSpPr>
+        <p:spPr>
+          <a:xfrm>
+            <a:off x="4022434" y="6252397"/>
+            <a:ext cx="4147127" cy="369332"/>
+          </a:xfrm>
+          <a:prstGeom prst="rect">
+            <a:avLst/>
+          </a:prstGeom>
+          <a:noFill/>
+        </p:spPr>
+        <p:txBody>
+          <a:bodyPr wrap="square" rtlCol="0">
+            <a:spAutoFit/>
+          </a:bodyPr>
+          <a:lstStyle/>
+          <a:p>
+            <a:r>
+              <a:rPr lang="en-US" dirty="0"/>
+              <a:t>Posted By: </a:t>
+            </a:r>
+            <a:r>
+              <a:rPr lang="en-US" dirty="0" err="1"/>
+              <a:t>UserABCD</a:t>
+            </a:r>
+            <a:endParaRPr lang="en-US" dirty="0"/>
           </a:p>
         </p:txBody>
       </p:sp>
     </p:spTree>
     <p:extLst>
       <p:ext uri="{BB962C8B-B14F-4D97-AF65-F5344CB8AC3E}">
-        <p14:creationId xmlns:p14="http://schemas.microsoft.com/office/powerpoint/2010/main" val="1230075902"/>
+        <p14:creationId xmlns:p14="http://schemas.microsoft.com/office/powerpoint/2010/main" val="2881041793"/>
       </p:ext>
     </p:extLst>
   </p:cSld>
@@ -5114,6 +5758,276 @@
       </p:grpSpPr>
       <p:sp>
         <p:nvSpPr>
+          <p:cNvPr id="3" name="Rectangle 2">
+            <a:extLst>
+              <a:ext uri="{FF2B5EF4-FFF2-40B4-BE49-F238E27FC236}">
+                <a16:creationId xmlns:a16="http://schemas.microsoft.com/office/drawing/2014/main" id="{09EB6145-F196-BA75-4B3E-EED7851B2ACB}"/>
+              </a:ext>
+            </a:extLst>
+          </p:cNvPr>
+          <p:cNvSpPr/>
+          <p:nvPr/>
+        </p:nvSpPr>
+        <p:spPr>
+          <a:xfrm>
+            <a:off x="242835" y="200967"/>
+            <a:ext cx="11706330" cy="6451042"/>
+          </a:xfrm>
+          <a:prstGeom prst="rect">
+            <a:avLst/>
+          </a:prstGeom>
+          <a:noFill/>
+        </p:spPr>
+        <p:style>
+          <a:lnRef idx="2">
+            <a:schemeClr val="accent1">
+              <a:shade val="15000"/>
+            </a:schemeClr>
+          </a:lnRef>
+          <a:fillRef idx="1">
+            <a:schemeClr val="accent1"/>
+          </a:fillRef>
+          <a:effectRef idx="0">
+            <a:schemeClr val="accent1"/>
+          </a:effectRef>
+          <a:fontRef idx="minor">
+            <a:schemeClr val="lt1"/>
+          </a:fontRef>
+        </p:style>
+        <p:txBody>
+          <a:bodyPr rtlCol="0" anchor="ctr"/>
+          <a:lstStyle/>
+          <a:p>
+            <a:pPr algn="ctr"/>
+            <a:endParaRPr lang="en-US" dirty="0"/>
+          </a:p>
+        </p:txBody>
+      </p:sp>
+      <p:sp>
+        <p:nvSpPr>
+          <p:cNvPr id="14" name="Rectangle: Rounded Corners 13">
+            <a:extLst>
+              <a:ext uri="{FF2B5EF4-FFF2-40B4-BE49-F238E27FC236}">
+                <a16:creationId xmlns:a16="http://schemas.microsoft.com/office/drawing/2014/main" id="{462EB88B-18C0-73B8-1596-E8B79A8C25FF}"/>
+              </a:ext>
+            </a:extLst>
+          </p:cNvPr>
+          <p:cNvSpPr/>
+          <p:nvPr/>
+        </p:nvSpPr>
+        <p:spPr>
+          <a:xfrm>
+            <a:off x="3543079" y="3523220"/>
+            <a:ext cx="5274128" cy="923331"/>
+          </a:xfrm>
+          <a:prstGeom prst="roundRect">
+            <a:avLst/>
+          </a:prstGeom>
+        </p:spPr>
+        <p:style>
+          <a:lnRef idx="2">
+            <a:schemeClr val="accent1">
+              <a:shade val="15000"/>
+            </a:schemeClr>
+          </a:lnRef>
+          <a:fillRef idx="1">
+            <a:schemeClr val="accent1"/>
+          </a:fillRef>
+          <a:effectRef idx="0">
+            <a:schemeClr val="accent1"/>
+          </a:effectRef>
+          <a:fontRef idx="minor">
+            <a:schemeClr val="lt1"/>
+          </a:fontRef>
+        </p:style>
+        <p:txBody>
+          <a:bodyPr rtlCol="0" anchor="ctr"/>
+          <a:lstStyle/>
+          <a:p>
+            <a:pPr algn="ctr"/>
+            <a:r>
+              <a:rPr lang="en-US" dirty="0"/>
+              <a:t>Login</a:t>
+            </a:r>
+          </a:p>
+        </p:txBody>
+      </p:sp>
+      <p:sp>
+        <p:nvSpPr>
+          <p:cNvPr id="15" name="Rectangle 14">
+            <a:extLst>
+              <a:ext uri="{FF2B5EF4-FFF2-40B4-BE49-F238E27FC236}">
+                <a16:creationId xmlns:a16="http://schemas.microsoft.com/office/drawing/2014/main" id="{2F28C8CE-0641-4BDC-3993-118AA2F43F1D}"/>
+              </a:ext>
+            </a:extLst>
+          </p:cNvPr>
+          <p:cNvSpPr/>
+          <p:nvPr/>
+        </p:nvSpPr>
+        <p:spPr>
+          <a:xfrm>
+            <a:off x="242835" y="200966"/>
+            <a:ext cx="11706330" cy="874206"/>
+          </a:xfrm>
+          <a:prstGeom prst="rect">
+            <a:avLst/>
+          </a:prstGeom>
+          <a:noFill/>
+        </p:spPr>
+        <p:style>
+          <a:lnRef idx="2">
+            <a:schemeClr val="accent1">
+              <a:shade val="15000"/>
+            </a:schemeClr>
+          </a:lnRef>
+          <a:fillRef idx="1">
+            <a:schemeClr val="accent1"/>
+          </a:fillRef>
+          <a:effectRef idx="0">
+            <a:schemeClr val="accent1"/>
+          </a:effectRef>
+          <a:fontRef idx="minor">
+            <a:schemeClr val="lt1"/>
+          </a:fontRef>
+        </p:style>
+        <p:txBody>
+          <a:bodyPr rtlCol="0" anchor="ctr"/>
+          <a:lstStyle/>
+          <a:p>
+            <a:pPr algn="ctr"/>
+            <a:endParaRPr lang="en-US" dirty="0">
+              <a:solidFill>
+                <a:schemeClr val="tx1"/>
+              </a:solidFill>
+            </a:endParaRPr>
+          </a:p>
+        </p:txBody>
+      </p:sp>
+      <p:sp>
+        <p:nvSpPr>
+          <p:cNvPr id="5" name="TextBox 4">
+            <a:extLst>
+              <a:ext uri="{FF2B5EF4-FFF2-40B4-BE49-F238E27FC236}">
+                <a16:creationId xmlns:a16="http://schemas.microsoft.com/office/drawing/2014/main" id="{474717AD-CE4F-D03C-3A7B-1D8EC78F21DD}"/>
+              </a:ext>
+            </a:extLst>
+          </p:cNvPr>
+          <p:cNvSpPr txBox="1"/>
+          <p:nvPr/>
+        </p:nvSpPr>
+        <p:spPr>
+          <a:xfrm>
+            <a:off x="783550" y="2241095"/>
+            <a:ext cx="10793186" cy="923330"/>
+          </a:xfrm>
+          <a:prstGeom prst="rect">
+            <a:avLst/>
+          </a:prstGeom>
+          <a:noFill/>
+        </p:spPr>
+        <p:txBody>
+          <a:bodyPr wrap="square" rtlCol="0">
+            <a:spAutoFit/>
+          </a:bodyPr>
+          <a:lstStyle/>
+          <a:p>
+            <a:r>
+              <a:rPr lang="en-US" dirty="0"/>
+              <a:t>Username :  __________________________________________________________________________________</a:t>
+            </a:r>
+          </a:p>
+          <a:p>
+            <a:endParaRPr lang="en-US" dirty="0"/>
+          </a:p>
+          <a:p>
+            <a:r>
+              <a:rPr lang="en-US" dirty="0"/>
+              <a:t>Password   :  __________________________________________________________________________________</a:t>
+            </a:r>
+          </a:p>
+        </p:txBody>
+      </p:sp>
+      <p:sp>
+        <p:nvSpPr>
+          <p:cNvPr id="6" name="Rectangle: Rounded Corners 5">
+            <a:extLst>
+              <a:ext uri="{FF2B5EF4-FFF2-40B4-BE49-F238E27FC236}">
+                <a16:creationId xmlns:a16="http://schemas.microsoft.com/office/drawing/2014/main" id="{07219D55-E805-DBD6-0895-0F877BBCCFCB}"/>
+              </a:ext>
+            </a:extLst>
+          </p:cNvPr>
+          <p:cNvSpPr/>
+          <p:nvPr/>
+        </p:nvSpPr>
+        <p:spPr>
+          <a:xfrm>
+            <a:off x="3543079" y="4699928"/>
+            <a:ext cx="5274128" cy="923331"/>
+          </a:xfrm>
+          <a:prstGeom prst="roundRect">
+            <a:avLst/>
+          </a:prstGeom>
+        </p:spPr>
+        <p:style>
+          <a:lnRef idx="2">
+            <a:schemeClr val="accent1">
+              <a:shade val="15000"/>
+            </a:schemeClr>
+          </a:lnRef>
+          <a:fillRef idx="1">
+            <a:schemeClr val="accent1"/>
+          </a:fillRef>
+          <a:effectRef idx="0">
+            <a:schemeClr val="accent1"/>
+          </a:effectRef>
+          <a:fontRef idx="minor">
+            <a:schemeClr val="lt1"/>
+          </a:fontRef>
+        </p:style>
+        <p:txBody>
+          <a:bodyPr rtlCol="0" anchor="ctr"/>
+          <a:lstStyle/>
+          <a:p>
+            <a:pPr algn="ctr"/>
+            <a:r>
+              <a:rPr lang="en-US" dirty="0"/>
+              <a:t>Register</a:t>
+            </a:r>
+          </a:p>
+        </p:txBody>
+      </p:sp>
+    </p:spTree>
+    <p:extLst>
+      <p:ext uri="{BB962C8B-B14F-4D97-AF65-F5344CB8AC3E}">
+        <p14:creationId xmlns:p14="http://schemas.microsoft.com/office/powerpoint/2010/main" val="1230075902"/>
+      </p:ext>
+    </p:extLst>
+  </p:cSld>
+  <p:clrMapOvr>
+    <a:masterClrMapping/>
+  </p:clrMapOvr>
+</p:sld>
+</file>
+
+<file path=ppt/slides/slide4.xml><?xml version="1.0" encoding="utf-8"?>
+<p:sld xmlns:a="http://schemas.openxmlformats.org/drawingml/2006/main" xmlns:r="http://schemas.openxmlformats.org/officeDocument/2006/relationships" xmlns:p="http://schemas.openxmlformats.org/presentationml/2006/main">
+  <p:cSld>
+    <p:spTree>
+      <p:nvGrpSpPr>
+        <p:cNvPr id="1" name=""/>
+        <p:cNvGrpSpPr/>
+        <p:nvPr/>
+      </p:nvGrpSpPr>
+      <p:grpSpPr>
+        <a:xfrm>
+          <a:off x="0" y="0"/>
+          <a:ext cx="0" cy="0"/>
+          <a:chOff x="0" y="0"/>
+          <a:chExt cx="0" cy="0"/>
+        </a:xfrm>
+      </p:grpSpPr>
+      <p:sp>
+        <p:nvSpPr>
           <p:cNvPr id="9" name="Rectangle 8">
             <a:extLst>
               <a:ext uri="{FF2B5EF4-FFF2-40B4-BE49-F238E27FC236}">
@@ -5622,432 +6536,6 @@
   <p:clrMapOvr>
     <a:masterClrMapping/>
   </p:clrMapOvr>
-  <p:extLst>
-    <p:ext uri="{6950BFC3-D8DA-4A85-94F7-54DA5524770B}">
-      <p188:commentRel xmlns:p188="http://schemas.microsoft.com/office/powerpoint/2018/8/main" r:id="rId3"/>
-    </p:ext>
-  </p:extLst>
-</p:sld>
-</file>
-
-<file path=ppt/slides/slide4.xml><?xml version="1.0" encoding="utf-8"?>
-<p:sld xmlns:a="http://schemas.openxmlformats.org/drawingml/2006/main" xmlns:r="http://schemas.openxmlformats.org/officeDocument/2006/relationships" xmlns:p="http://schemas.openxmlformats.org/presentationml/2006/main">
-  <p:cSld>
-    <p:spTree>
-      <p:nvGrpSpPr>
-        <p:cNvPr id="1" name=""/>
-        <p:cNvGrpSpPr/>
-        <p:nvPr/>
-      </p:nvGrpSpPr>
-      <p:grpSpPr>
-        <a:xfrm>
-          <a:off x="0" y="0"/>
-          <a:ext cx="0" cy="0"/>
-          <a:chOff x="0" y="0"/>
-          <a:chExt cx="0" cy="0"/>
-        </a:xfrm>
-      </p:grpSpPr>
-      <p:sp>
-        <p:nvSpPr>
-          <p:cNvPr id="9" name="Rectangle 8">
-            <a:extLst>
-              <a:ext uri="{FF2B5EF4-FFF2-40B4-BE49-F238E27FC236}">
-                <a16:creationId xmlns:a16="http://schemas.microsoft.com/office/drawing/2014/main" id="{F50557A8-8943-F711-C854-1442083C28F3}"/>
-              </a:ext>
-            </a:extLst>
-          </p:cNvPr>
-          <p:cNvSpPr/>
-          <p:nvPr/>
-        </p:nvSpPr>
-        <p:spPr>
-          <a:xfrm>
-            <a:off x="2558980" y="1075172"/>
-            <a:ext cx="7074040" cy="5576837"/>
-          </a:xfrm>
-          <a:prstGeom prst="rect">
-            <a:avLst/>
-          </a:prstGeom>
-          <a:noFill/>
-        </p:spPr>
-        <p:style>
-          <a:lnRef idx="2">
-            <a:schemeClr val="accent1">
-              <a:shade val="15000"/>
-            </a:schemeClr>
-          </a:lnRef>
-          <a:fillRef idx="1">
-            <a:schemeClr val="accent1"/>
-          </a:fillRef>
-          <a:effectRef idx="0">
-            <a:schemeClr val="accent1"/>
-          </a:effectRef>
-          <a:fontRef idx="minor">
-            <a:schemeClr val="lt1"/>
-          </a:fontRef>
-        </p:style>
-        <p:txBody>
-          <a:bodyPr rtlCol="0" anchor="ctr"/>
-          <a:lstStyle/>
-          <a:p>
-            <a:pPr algn="ctr"/>
-            <a:endParaRPr lang="en-US" dirty="0"/>
-          </a:p>
-        </p:txBody>
-      </p:sp>
-      <p:sp>
-        <p:nvSpPr>
-          <p:cNvPr id="15" name="Rectangle 14">
-            <a:extLst>
-              <a:ext uri="{FF2B5EF4-FFF2-40B4-BE49-F238E27FC236}">
-                <a16:creationId xmlns:a16="http://schemas.microsoft.com/office/drawing/2014/main" id="{2F28C8CE-0641-4BDC-3993-118AA2F43F1D}"/>
-              </a:ext>
-            </a:extLst>
-          </p:cNvPr>
-          <p:cNvSpPr/>
-          <p:nvPr/>
-        </p:nvSpPr>
-        <p:spPr>
-          <a:xfrm>
-            <a:off x="242835" y="200966"/>
-            <a:ext cx="11706330" cy="874206"/>
-          </a:xfrm>
-          <a:prstGeom prst="rect">
-            <a:avLst/>
-          </a:prstGeom>
-          <a:noFill/>
-        </p:spPr>
-        <p:style>
-          <a:lnRef idx="2">
-            <a:schemeClr val="accent1">
-              <a:shade val="15000"/>
-            </a:schemeClr>
-          </a:lnRef>
-          <a:fillRef idx="1">
-            <a:schemeClr val="accent1"/>
-          </a:fillRef>
-          <a:effectRef idx="0">
-            <a:schemeClr val="accent1"/>
-          </a:effectRef>
-          <a:fontRef idx="minor">
-            <a:schemeClr val="lt1"/>
-          </a:fontRef>
-        </p:style>
-        <p:txBody>
-          <a:bodyPr rtlCol="0" anchor="ctr"/>
-          <a:lstStyle/>
-          <a:p>
-            <a:pPr algn="ctr"/>
-            <a:r>
-              <a:rPr lang="en-US" u="sng" dirty="0">
-                <a:solidFill>
-                  <a:schemeClr val="tx1"/>
-                </a:solidFill>
-              </a:rPr>
-              <a:t>Image Sharing</a:t>
-            </a:r>
-            <a:r>
-              <a:rPr lang="en-US" dirty="0">
-                <a:solidFill>
-                  <a:schemeClr val="tx1"/>
-                </a:solidFill>
-              </a:rPr>
-              <a:t>	Image Creation	Leaderboard	</a:t>
-            </a:r>
-          </a:p>
-        </p:txBody>
-      </p:sp>
-      <p:sp>
-        <p:nvSpPr>
-          <p:cNvPr id="31" name="Rectangle: Rounded Corners 30">
-            <a:extLst>
-              <a:ext uri="{FF2B5EF4-FFF2-40B4-BE49-F238E27FC236}">
-                <a16:creationId xmlns:a16="http://schemas.microsoft.com/office/drawing/2014/main" id="{A64B17D0-F6E3-8952-7582-8E8820143122}"/>
-              </a:ext>
-            </a:extLst>
-          </p:cNvPr>
-          <p:cNvSpPr/>
-          <p:nvPr/>
-        </p:nvSpPr>
-        <p:spPr>
-          <a:xfrm>
-            <a:off x="10009415" y="439613"/>
-            <a:ext cx="1797398" cy="462854"/>
-          </a:xfrm>
-          <a:prstGeom prst="roundRect">
-            <a:avLst/>
-          </a:prstGeom>
-        </p:spPr>
-        <p:style>
-          <a:lnRef idx="2">
-            <a:schemeClr val="accent1">
-              <a:shade val="15000"/>
-            </a:schemeClr>
-          </a:lnRef>
-          <a:fillRef idx="1">
-            <a:schemeClr val="accent1"/>
-          </a:fillRef>
-          <a:effectRef idx="0">
-            <a:schemeClr val="accent1"/>
-          </a:effectRef>
-          <a:fontRef idx="minor">
-            <a:schemeClr val="lt1"/>
-          </a:fontRef>
-        </p:style>
-        <p:txBody>
-          <a:bodyPr rtlCol="0" anchor="ctr"/>
-          <a:lstStyle/>
-          <a:p>
-            <a:pPr algn="ctr"/>
-            <a:r>
-              <a:rPr lang="en-US" dirty="0"/>
-              <a:t>Logout</a:t>
-            </a:r>
-          </a:p>
-        </p:txBody>
-      </p:sp>
-      <p:sp>
-        <p:nvSpPr>
-          <p:cNvPr id="3" name="Rectangle 2">
-            <a:extLst>
-              <a:ext uri="{FF2B5EF4-FFF2-40B4-BE49-F238E27FC236}">
-                <a16:creationId xmlns:a16="http://schemas.microsoft.com/office/drawing/2014/main" id="{75084102-0245-7FDC-A3B4-176B58C1AF0A}"/>
-              </a:ext>
-            </a:extLst>
-          </p:cNvPr>
-          <p:cNvSpPr/>
-          <p:nvPr/>
-        </p:nvSpPr>
-        <p:spPr>
-          <a:xfrm>
-            <a:off x="2946400" y="1551710"/>
-            <a:ext cx="6428509" cy="4231118"/>
-          </a:xfrm>
-          <a:prstGeom prst="rect">
-            <a:avLst/>
-          </a:prstGeom>
-          <a:noFill/>
-        </p:spPr>
-        <p:style>
-          <a:lnRef idx="2">
-            <a:schemeClr val="accent1">
-              <a:shade val="15000"/>
-            </a:schemeClr>
-          </a:lnRef>
-          <a:fillRef idx="1">
-            <a:schemeClr val="accent1"/>
-          </a:fillRef>
-          <a:effectRef idx="0">
-            <a:schemeClr val="accent1"/>
-          </a:effectRef>
-          <a:fontRef idx="minor">
-            <a:schemeClr val="lt1"/>
-          </a:fontRef>
-        </p:style>
-        <p:txBody>
-          <a:bodyPr rtlCol="0" anchor="ctr"/>
-          <a:lstStyle/>
-          <a:p>
-            <a:pPr algn="ctr"/>
-            <a:endParaRPr lang="en-US" dirty="0"/>
-          </a:p>
-        </p:txBody>
-      </p:sp>
-      <p:sp>
-        <p:nvSpPr>
-          <p:cNvPr id="5" name="TextBox 4">
-            <a:extLst>
-              <a:ext uri="{FF2B5EF4-FFF2-40B4-BE49-F238E27FC236}">
-                <a16:creationId xmlns:a16="http://schemas.microsoft.com/office/drawing/2014/main" id="{ABE54764-FC6F-ADAE-D628-D193B94D3AA9}"/>
-              </a:ext>
-            </a:extLst>
-          </p:cNvPr>
-          <p:cNvSpPr txBox="1"/>
-          <p:nvPr/>
-        </p:nvSpPr>
-        <p:spPr>
-          <a:xfrm>
-            <a:off x="4027056" y="2013527"/>
-            <a:ext cx="3905560" cy="369332"/>
-          </a:xfrm>
-          <a:prstGeom prst="rect">
-            <a:avLst/>
-          </a:prstGeom>
-          <a:noFill/>
-        </p:spPr>
-        <p:txBody>
-          <a:bodyPr wrap="square" rtlCol="0">
-            <a:spAutoFit/>
-          </a:bodyPr>
-          <a:lstStyle/>
-          <a:p>
-            <a:r>
-              <a:rPr lang="en-US" dirty="0"/>
-              <a:t>Upload Image:</a:t>
-            </a:r>
-            <a:r>
-              <a:rPr lang="en-US" u="sng" dirty="0"/>
-              <a:t>			</a:t>
-            </a:r>
-            <a:r>
-              <a:rPr lang="en-US" dirty="0"/>
-              <a:t>                                            </a:t>
-            </a:r>
-          </a:p>
-        </p:txBody>
-      </p:sp>
-      <p:sp>
-        <p:nvSpPr>
-          <p:cNvPr id="7" name="TextBox 6">
-            <a:extLst>
-              <a:ext uri="{FF2B5EF4-FFF2-40B4-BE49-F238E27FC236}">
-                <a16:creationId xmlns:a16="http://schemas.microsoft.com/office/drawing/2014/main" id="{39BFFFBE-D982-BF26-F980-94DF1CD46B84}"/>
-              </a:ext>
-            </a:extLst>
-          </p:cNvPr>
-          <p:cNvSpPr txBox="1"/>
-          <p:nvPr/>
-        </p:nvSpPr>
-        <p:spPr>
-          <a:xfrm>
-            <a:off x="4049055" y="2475344"/>
-            <a:ext cx="4322618" cy="369332"/>
-          </a:xfrm>
-          <a:prstGeom prst="rect">
-            <a:avLst/>
-          </a:prstGeom>
-          <a:noFill/>
-        </p:spPr>
-        <p:txBody>
-          <a:bodyPr wrap="square" rtlCol="0">
-            <a:spAutoFit/>
-          </a:bodyPr>
-          <a:lstStyle/>
-          <a:p>
-            <a:r>
-              <a:rPr lang="en-US" dirty="0"/>
-              <a:t>Description:</a:t>
-            </a:r>
-            <a:r>
-              <a:rPr lang="en-US" u="sng" dirty="0"/>
-              <a:t>			</a:t>
-            </a:r>
-            <a:endParaRPr lang="en-US" dirty="0"/>
-          </a:p>
-        </p:txBody>
-      </p:sp>
-      <p:sp>
-        <p:nvSpPr>
-          <p:cNvPr id="8" name="Rectangle: Rounded Corners 7">
-            <a:extLst>
-              <a:ext uri="{FF2B5EF4-FFF2-40B4-BE49-F238E27FC236}">
-                <a16:creationId xmlns:a16="http://schemas.microsoft.com/office/drawing/2014/main" id="{7894FCFE-1695-1A28-C976-9111587C72A3}"/>
-              </a:ext>
-            </a:extLst>
-          </p:cNvPr>
-          <p:cNvSpPr/>
-          <p:nvPr/>
-        </p:nvSpPr>
-        <p:spPr>
-          <a:xfrm>
-            <a:off x="4027055" y="3138825"/>
-            <a:ext cx="4322618" cy="462854"/>
-          </a:xfrm>
-          <a:prstGeom prst="roundRect">
-            <a:avLst/>
-          </a:prstGeom>
-        </p:spPr>
-        <p:style>
-          <a:lnRef idx="2">
-            <a:schemeClr val="accent1">
-              <a:shade val="15000"/>
-            </a:schemeClr>
-          </a:lnRef>
-          <a:fillRef idx="1">
-            <a:schemeClr val="accent1"/>
-          </a:fillRef>
-          <a:effectRef idx="0">
-            <a:schemeClr val="accent1"/>
-          </a:effectRef>
-          <a:fontRef idx="minor">
-            <a:schemeClr val="lt1"/>
-          </a:fontRef>
-        </p:style>
-        <p:txBody>
-          <a:bodyPr rtlCol="0" anchor="ctr"/>
-          <a:lstStyle/>
-          <a:p>
-            <a:pPr algn="ctr"/>
-            <a:r>
-              <a:rPr lang="en-US" dirty="0"/>
-              <a:t>Share Image</a:t>
-            </a:r>
-          </a:p>
-        </p:txBody>
-      </p:sp>
-      <p:sp>
-        <p:nvSpPr>
-          <p:cNvPr id="11" name="Rectangle: Rounded Corners 10">
-            <a:extLst>
-              <a:ext uri="{FF2B5EF4-FFF2-40B4-BE49-F238E27FC236}">
-                <a16:creationId xmlns:a16="http://schemas.microsoft.com/office/drawing/2014/main" id="{339F3B97-0AB6-E041-CF4C-04741DF1BBB5}"/>
-              </a:ext>
-            </a:extLst>
-          </p:cNvPr>
-          <p:cNvSpPr/>
-          <p:nvPr/>
-        </p:nvSpPr>
-        <p:spPr>
-          <a:xfrm>
-            <a:off x="7932616" y="2071077"/>
-            <a:ext cx="1397494" cy="311782"/>
-          </a:xfrm>
-          <a:prstGeom prst="roundRect">
-            <a:avLst/>
-          </a:prstGeom>
-        </p:spPr>
-        <p:style>
-          <a:lnRef idx="2">
-            <a:schemeClr val="accent1">
-              <a:shade val="15000"/>
-            </a:schemeClr>
-          </a:lnRef>
-          <a:fillRef idx="1">
-            <a:schemeClr val="accent1"/>
-          </a:fillRef>
-          <a:effectRef idx="0">
-            <a:schemeClr val="accent1"/>
-          </a:effectRef>
-          <a:fontRef idx="minor">
-            <a:schemeClr val="lt1"/>
-          </a:fontRef>
-        </p:style>
-        <p:txBody>
-          <a:bodyPr rtlCol="0" anchor="ctr"/>
-          <a:lstStyle/>
-          <a:p>
-            <a:pPr algn="ctr"/>
-            <a:r>
-              <a:rPr lang="en-US" dirty="0"/>
-              <a:t>Search</a:t>
-            </a:r>
-          </a:p>
-        </p:txBody>
-      </p:sp>
-    </p:spTree>
-    <p:extLst>
-      <p:ext uri="{BB962C8B-B14F-4D97-AF65-F5344CB8AC3E}">
-        <p14:creationId xmlns:p14="http://schemas.microsoft.com/office/powerpoint/2010/main" val="3101795238"/>
-      </p:ext>
-    </p:extLst>
-  </p:cSld>
-  <p:clrMapOvr>
-    <a:masterClrMapping/>
-  </p:clrMapOvr>
-  <p:extLst>
-    <p:ext uri="{6950BFC3-D8DA-4A85-94F7-54DA5524770B}">
-      <p188:commentRel xmlns:p188="http://schemas.microsoft.com/office/powerpoint/2018/8/main" r:id="rId3"/>
-    </p:ext>
-  </p:extLst>
 </p:sld>
 </file>
 
@@ -6070,10 +6558,10 @@
       </p:grpSpPr>
       <p:sp>
         <p:nvSpPr>
-          <p:cNvPr id="3" name="Rectangle 2">
-            <a:extLst>
-              <a:ext uri="{FF2B5EF4-FFF2-40B4-BE49-F238E27FC236}">
-                <a16:creationId xmlns:a16="http://schemas.microsoft.com/office/drawing/2014/main" id="{09EB6145-F196-BA75-4B3E-EED7851B2ACB}"/>
+          <p:cNvPr id="9" name="Rectangle 8">
+            <a:extLst>
+              <a:ext uri="{FF2B5EF4-FFF2-40B4-BE49-F238E27FC236}">
+                <a16:creationId xmlns:a16="http://schemas.microsoft.com/office/drawing/2014/main" id="{F50557A8-8943-F711-C854-1442083C28F3}"/>
               </a:ext>
             </a:extLst>
           </p:cNvPr>
@@ -6082,15 +6570,13 @@
         </p:nvSpPr>
         <p:spPr>
           <a:xfrm>
-            <a:off x="242835" y="200967"/>
-            <a:ext cx="11706330" cy="6451042"/>
+            <a:off x="2558980" y="1075172"/>
+            <a:ext cx="7074040" cy="5576837"/>
           </a:xfrm>
           <a:prstGeom prst="rect">
             <a:avLst/>
           </a:prstGeom>
-          <a:solidFill>
-            <a:schemeClr val="bg1"/>
-          </a:solidFill>
+          <a:noFill/>
         </p:spPr>
         <p:style>
           <a:lnRef idx="2">
@@ -6113,20 +6599,16 @@
           <a:lstStyle/>
           <a:p>
             <a:pPr algn="ctr"/>
-            <a:endParaRPr lang="en-US" dirty="0">
-              <a:solidFill>
-                <a:schemeClr val="tx1"/>
-              </a:solidFill>
-            </a:endParaRPr>
-          </a:p>
-        </p:txBody>
-      </p:sp>
-      <p:sp>
-        <p:nvSpPr>
-          <p:cNvPr id="9" name="Rectangle 8">
-            <a:extLst>
-              <a:ext uri="{FF2B5EF4-FFF2-40B4-BE49-F238E27FC236}">
-                <a16:creationId xmlns:a16="http://schemas.microsoft.com/office/drawing/2014/main" id="{F50557A8-8943-F711-C854-1442083C28F3}"/>
+            <a:endParaRPr lang="en-US" dirty="0"/>
+          </a:p>
+        </p:txBody>
+      </p:sp>
+      <p:sp>
+        <p:nvSpPr>
+          <p:cNvPr id="15" name="Rectangle 14">
+            <a:extLst>
+              <a:ext uri="{FF2B5EF4-FFF2-40B4-BE49-F238E27FC236}">
+                <a16:creationId xmlns:a16="http://schemas.microsoft.com/office/drawing/2014/main" id="{2F28C8CE-0641-4BDC-3993-118AA2F43F1D}"/>
               </a:ext>
             </a:extLst>
           </p:cNvPr>
@@ -6135,8 +6617,8 @@
         </p:nvSpPr>
         <p:spPr>
           <a:xfrm>
-            <a:off x="2558980" y="1075172"/>
-            <a:ext cx="7074040" cy="5576837"/>
+            <a:off x="242835" y="200966"/>
+            <a:ext cx="11706330" cy="874206"/>
           </a:xfrm>
           <a:prstGeom prst="rect">
             <a:avLst/>
@@ -6164,16 +6646,31 @@
           <a:lstStyle/>
           <a:p>
             <a:pPr algn="ctr"/>
-            <a:endParaRPr lang="en-US" dirty="0"/>
-          </a:p>
-        </p:txBody>
-      </p:sp>
-      <p:sp>
-        <p:nvSpPr>
-          <p:cNvPr id="15" name="Rectangle 14">
-            <a:extLst>
-              <a:ext uri="{FF2B5EF4-FFF2-40B4-BE49-F238E27FC236}">
-                <a16:creationId xmlns:a16="http://schemas.microsoft.com/office/drawing/2014/main" id="{2F28C8CE-0641-4BDC-3993-118AA2F43F1D}"/>
+            <a:r>
+              <a:rPr lang="en-US" u="sng" dirty="0">
+                <a:solidFill>
+                  <a:schemeClr val="tx1"/>
+                </a:solidFill>
+              </a:rPr>
+              <a:t>Image Sharing</a:t>
+            </a:r>
+            <a:r>
+              <a:rPr lang="en-US" dirty="0">
+                <a:solidFill>
+                  <a:schemeClr val="tx1"/>
+                </a:solidFill>
+              </a:rPr>
+              <a:t>	Image Creation	Leaderboard	</a:t>
+            </a:r>
+          </a:p>
+        </p:txBody>
+      </p:sp>
+      <p:sp>
+        <p:nvSpPr>
+          <p:cNvPr id="31" name="Rectangle: Rounded Corners 30">
+            <a:extLst>
+              <a:ext uri="{FF2B5EF4-FFF2-40B4-BE49-F238E27FC236}">
+                <a16:creationId xmlns:a16="http://schemas.microsoft.com/office/drawing/2014/main" id="{A64B17D0-F6E3-8952-7582-8E8820143122}"/>
               </a:ext>
             </a:extLst>
           </p:cNvPr>
@@ -6182,13 +6679,12 @@
         </p:nvSpPr>
         <p:spPr>
           <a:xfrm>
-            <a:off x="242835" y="200966"/>
-            <a:ext cx="11706330" cy="874206"/>
-          </a:xfrm>
-          <a:prstGeom prst="rect">
+            <a:off x="10009415" y="439613"/>
+            <a:ext cx="1797398" cy="462854"/>
+          </a:xfrm>
+          <a:prstGeom prst="roundRect">
             <a:avLst/>
           </a:prstGeom>
-          <a:noFill/>
         </p:spPr>
         <p:style>
           <a:lnRef idx="2">
@@ -6212,38 +6708,18 @@
           <a:p>
             <a:pPr algn="ctr"/>
             <a:r>
-              <a:rPr lang="en-US" dirty="0">
-                <a:solidFill>
-                  <a:schemeClr val="tx1"/>
-                </a:solidFill>
-              </a:rPr>
-              <a:t>Image Sharing	</a:t>
-            </a:r>
-            <a:r>
-              <a:rPr lang="en-US" u="sng" dirty="0">
-                <a:solidFill>
-                  <a:schemeClr val="tx1"/>
-                </a:solidFill>
-              </a:rPr>
-              <a:t>Image Creation</a:t>
-            </a:r>
-            <a:r>
-              <a:rPr lang="en-US" dirty="0">
-                <a:solidFill>
-                  <a:schemeClr val="tx1"/>
-                </a:solidFill>
-              </a:rPr>
-              <a:t>	Leaderboard	</a:t>
-            </a:r>
-          </a:p>
-        </p:txBody>
-      </p:sp>
-      <p:sp>
-        <p:nvSpPr>
-          <p:cNvPr id="31" name="Rectangle: Rounded Corners 30">
-            <a:extLst>
-              <a:ext uri="{FF2B5EF4-FFF2-40B4-BE49-F238E27FC236}">
-                <a16:creationId xmlns:a16="http://schemas.microsoft.com/office/drawing/2014/main" id="{A64B17D0-F6E3-8952-7582-8E8820143122}"/>
+              <a:rPr lang="en-US" dirty="0"/>
+              <a:t>Logout</a:t>
+            </a:r>
+          </a:p>
+        </p:txBody>
+      </p:sp>
+      <p:sp>
+        <p:nvSpPr>
+          <p:cNvPr id="3" name="Rectangle 2">
+            <a:extLst>
+              <a:ext uri="{FF2B5EF4-FFF2-40B4-BE49-F238E27FC236}">
+                <a16:creationId xmlns:a16="http://schemas.microsoft.com/office/drawing/2014/main" id="{75084102-0245-7FDC-A3B4-176B58C1AF0A}"/>
               </a:ext>
             </a:extLst>
           </p:cNvPr>
@@ -6252,12 +6728,13 @@
         </p:nvSpPr>
         <p:spPr>
           <a:xfrm>
-            <a:off x="10009415" y="439613"/>
-            <a:ext cx="1797398" cy="462854"/>
-          </a:xfrm>
-          <a:prstGeom prst="roundRect">
+            <a:off x="2946400" y="1551710"/>
+            <a:ext cx="6428509" cy="4231118"/>
+          </a:xfrm>
+          <a:prstGeom prst="rect">
             <a:avLst/>
           </a:prstGeom>
+          <a:noFill/>
         </p:spPr>
         <p:style>
           <a:lnRef idx="2">
@@ -6280,19 +6757,99 @@
           <a:lstStyle/>
           <a:p>
             <a:pPr algn="ctr"/>
+            <a:endParaRPr lang="en-US" dirty="0"/>
+          </a:p>
+        </p:txBody>
+      </p:sp>
+      <p:sp>
+        <p:nvSpPr>
+          <p:cNvPr id="5" name="TextBox 4">
+            <a:extLst>
+              <a:ext uri="{FF2B5EF4-FFF2-40B4-BE49-F238E27FC236}">
+                <a16:creationId xmlns:a16="http://schemas.microsoft.com/office/drawing/2014/main" id="{ABE54764-FC6F-ADAE-D628-D193B94D3AA9}"/>
+              </a:ext>
+            </a:extLst>
+          </p:cNvPr>
+          <p:cNvSpPr txBox="1"/>
+          <p:nvPr/>
+        </p:nvSpPr>
+        <p:spPr>
+          <a:xfrm>
+            <a:off x="4027056" y="2013527"/>
+            <a:ext cx="3905560" cy="369332"/>
+          </a:xfrm>
+          <a:prstGeom prst="rect">
+            <a:avLst/>
+          </a:prstGeom>
+          <a:noFill/>
+        </p:spPr>
+        <p:txBody>
+          <a:bodyPr wrap="square" rtlCol="0">
+            <a:spAutoFit/>
+          </a:bodyPr>
+          <a:lstStyle/>
+          <a:p>
             <a:r>
               <a:rPr lang="en-US" dirty="0"/>
-              <a:t>Logout</a:t>
-            </a:r>
-          </a:p>
-        </p:txBody>
-      </p:sp>
-      <p:sp>
-        <p:nvSpPr>
-          <p:cNvPr id="4" name="Rectangle 3">
-            <a:extLst>
-              <a:ext uri="{FF2B5EF4-FFF2-40B4-BE49-F238E27FC236}">
-                <a16:creationId xmlns:a16="http://schemas.microsoft.com/office/drawing/2014/main" id="{3D5AC6B3-9861-021C-A412-59E7DD7737AD}"/>
+              <a:t>Upload Image:</a:t>
+            </a:r>
+            <a:r>
+              <a:rPr lang="en-US" u="sng" dirty="0"/>
+              <a:t>			</a:t>
+            </a:r>
+            <a:r>
+              <a:rPr lang="en-US" dirty="0"/>
+              <a:t>                                            </a:t>
+            </a:r>
+          </a:p>
+        </p:txBody>
+      </p:sp>
+      <p:sp>
+        <p:nvSpPr>
+          <p:cNvPr id="7" name="TextBox 6">
+            <a:extLst>
+              <a:ext uri="{FF2B5EF4-FFF2-40B4-BE49-F238E27FC236}">
+                <a16:creationId xmlns:a16="http://schemas.microsoft.com/office/drawing/2014/main" id="{39BFFFBE-D982-BF26-F980-94DF1CD46B84}"/>
+              </a:ext>
+            </a:extLst>
+          </p:cNvPr>
+          <p:cNvSpPr txBox="1"/>
+          <p:nvPr/>
+        </p:nvSpPr>
+        <p:spPr>
+          <a:xfrm>
+            <a:off x="4049055" y="2475344"/>
+            <a:ext cx="4322618" cy="369332"/>
+          </a:xfrm>
+          <a:prstGeom prst="rect">
+            <a:avLst/>
+          </a:prstGeom>
+          <a:noFill/>
+        </p:spPr>
+        <p:txBody>
+          <a:bodyPr wrap="square" rtlCol="0">
+            <a:spAutoFit/>
+          </a:bodyPr>
+          <a:lstStyle/>
+          <a:p>
+            <a:r>
+              <a:rPr lang="en-US" dirty="0"/>
+              <a:t>Description:</a:t>
+            </a:r>
+            <a:r>
+              <a:rPr lang="en-US" u="sng" dirty="0"/>
+              <a:t>			</a:t>
+            </a:r>
+            <a:endParaRPr lang="en-US" dirty="0"/>
+          </a:p>
+        </p:txBody>
+      </p:sp>
+      <p:sp>
+        <p:nvSpPr>
+          <p:cNvPr id="8" name="Rectangle: Rounded Corners 7">
+            <a:extLst>
+              <a:ext uri="{FF2B5EF4-FFF2-40B4-BE49-F238E27FC236}">
+                <a16:creationId xmlns:a16="http://schemas.microsoft.com/office/drawing/2014/main" id="{7894FCFE-1695-1A28-C976-9111587C72A3}"/>
               </a:ext>
             </a:extLst>
           </p:cNvPr>
@@ -6301,10 +6858,10 @@
         </p:nvSpPr>
         <p:spPr>
           <a:xfrm>
-            <a:off x="2632364" y="1202890"/>
-            <a:ext cx="6927272" cy="350982"/>
-          </a:xfrm>
-          <a:prstGeom prst="rect">
+            <a:off x="4027055" y="3138825"/>
+            <a:ext cx="4322618" cy="462854"/>
+          </a:xfrm>
+          <a:prstGeom prst="roundRect">
             <a:avLst/>
           </a:prstGeom>
         </p:spPr>
@@ -6331,17 +6888,17 @@
             <a:pPr algn="ctr"/>
             <a:r>
               <a:rPr lang="en-US" dirty="0"/>
-              <a:t>Create Image</a:t>
-            </a:r>
-          </a:p>
-        </p:txBody>
-      </p:sp>
-      <p:sp>
-        <p:nvSpPr>
-          <p:cNvPr id="5" name="Rectangle 4">
-            <a:extLst>
-              <a:ext uri="{FF2B5EF4-FFF2-40B4-BE49-F238E27FC236}">
-                <a16:creationId xmlns:a16="http://schemas.microsoft.com/office/drawing/2014/main" id="{06824CD3-D12A-62B2-5326-F98F040F9FE2}"/>
+              <a:t>Share Image</a:t>
+            </a:r>
+          </a:p>
+        </p:txBody>
+      </p:sp>
+      <p:sp>
+        <p:nvSpPr>
+          <p:cNvPr id="11" name="Rectangle: Rounded Corners 10">
+            <a:extLst>
+              <a:ext uri="{FF2B5EF4-FFF2-40B4-BE49-F238E27FC236}">
+                <a16:creationId xmlns:a16="http://schemas.microsoft.com/office/drawing/2014/main" id="{339F3B97-0AB6-E041-CF4C-04741DF1BBB5}"/>
               </a:ext>
             </a:extLst>
           </p:cNvPr>
@@ -6350,10 +6907,10 @@
         </p:nvSpPr>
         <p:spPr>
           <a:xfrm>
-            <a:off x="4022437" y="2165712"/>
-            <a:ext cx="4147127" cy="1948873"/>
-          </a:xfrm>
-          <a:prstGeom prst="rect">
+            <a:off x="7932616" y="2071077"/>
+            <a:ext cx="1397494" cy="311782"/>
+          </a:xfrm>
+          <a:prstGeom prst="roundRect">
             <a:avLst/>
           </a:prstGeom>
         </p:spPr>
@@ -6380,206 +6937,7 @@
             <a:pPr algn="ctr"/>
             <a:r>
               <a:rPr lang="en-US" dirty="0"/>
-              <a:t>Image</a:t>
-            </a:r>
-          </a:p>
-        </p:txBody>
-      </p:sp>
-      <p:sp>
-        <p:nvSpPr>
-          <p:cNvPr id="6" name="TextBox 5">
-            <a:extLst>
-              <a:ext uri="{FF2B5EF4-FFF2-40B4-BE49-F238E27FC236}">
-                <a16:creationId xmlns:a16="http://schemas.microsoft.com/office/drawing/2014/main" id="{89BF0A95-DC74-5FBD-2740-EEAF6A0D4F41}"/>
-              </a:ext>
-            </a:extLst>
-          </p:cNvPr>
-          <p:cNvSpPr txBox="1"/>
-          <p:nvPr/>
-        </p:nvSpPr>
-        <p:spPr>
-          <a:xfrm>
-            <a:off x="4022437" y="1801663"/>
-            <a:ext cx="4147127" cy="369332"/>
-          </a:xfrm>
-          <a:prstGeom prst="rect">
-            <a:avLst/>
-          </a:prstGeom>
-          <a:noFill/>
-        </p:spPr>
-        <p:txBody>
-          <a:bodyPr wrap="square" rtlCol="0">
-            <a:spAutoFit/>
-          </a:bodyPr>
-          <a:lstStyle/>
-          <a:p>
-            <a:r>
-              <a:rPr lang="en-US" dirty="0"/>
-              <a:t>Posted By: User1234</a:t>
-            </a:r>
-          </a:p>
-        </p:txBody>
-      </p:sp>
-      <p:cxnSp>
-        <p:nvCxnSpPr>
-          <p:cNvPr id="7" name="Straight Connector 6">
-            <a:extLst>
-              <a:ext uri="{FF2B5EF4-FFF2-40B4-BE49-F238E27FC236}">
-                <a16:creationId xmlns:a16="http://schemas.microsoft.com/office/drawing/2014/main" id="{0750715A-4B3C-3E56-E625-8ED0C18AA708}"/>
-              </a:ext>
-            </a:extLst>
-          </p:cNvPr>
-          <p:cNvCxnSpPr>
-            <a:cxnSpLocks/>
-          </p:cNvCxnSpPr>
-          <p:nvPr/>
-        </p:nvCxnSpPr>
-        <p:spPr>
-          <a:xfrm>
-            <a:off x="2632364" y="4754735"/>
-            <a:ext cx="7074040" cy="0"/>
-          </a:xfrm>
-          <a:prstGeom prst="line">
-            <a:avLst/>
-          </a:prstGeom>
-        </p:spPr>
-        <p:style>
-          <a:lnRef idx="1">
-            <a:schemeClr val="dk1"/>
-          </a:lnRef>
-          <a:fillRef idx="0">
-            <a:schemeClr val="dk1"/>
-          </a:fillRef>
-          <a:effectRef idx="0">
-            <a:schemeClr val="dk1"/>
-          </a:effectRef>
-          <a:fontRef idx="minor">
-            <a:schemeClr val="tx1"/>
-          </a:fontRef>
-        </p:style>
-      </p:cxnSp>
-      <p:cxnSp>
-        <p:nvCxnSpPr>
-          <p:cNvPr id="12" name="Straight Connector 11">
-            <a:extLst>
-              <a:ext uri="{FF2B5EF4-FFF2-40B4-BE49-F238E27FC236}">
-                <a16:creationId xmlns:a16="http://schemas.microsoft.com/office/drawing/2014/main" id="{6AFB503F-4545-4914-BED9-3FF093077284}"/>
-              </a:ext>
-            </a:extLst>
-          </p:cNvPr>
-          <p:cNvCxnSpPr>
-            <a:cxnSpLocks/>
-          </p:cNvCxnSpPr>
-          <p:nvPr/>
-        </p:nvCxnSpPr>
-        <p:spPr>
-          <a:xfrm>
-            <a:off x="2558980" y="1767344"/>
-            <a:ext cx="7074040" cy="0"/>
-          </a:xfrm>
-          <a:prstGeom prst="line">
-            <a:avLst/>
-          </a:prstGeom>
-        </p:spPr>
-        <p:style>
-          <a:lnRef idx="1">
-            <a:schemeClr val="dk1"/>
-          </a:lnRef>
-          <a:fillRef idx="0">
-            <a:schemeClr val="dk1"/>
-          </a:fillRef>
-          <a:effectRef idx="0">
-            <a:schemeClr val="dk1"/>
-          </a:effectRef>
-          <a:fontRef idx="minor">
-            <a:schemeClr val="tx1"/>
-          </a:fontRef>
-        </p:style>
-      </p:cxnSp>
-      <p:sp>
-        <p:nvSpPr>
-          <p:cNvPr id="13" name="TextBox 12">
-            <a:extLst>
-              <a:ext uri="{FF2B5EF4-FFF2-40B4-BE49-F238E27FC236}">
-                <a16:creationId xmlns:a16="http://schemas.microsoft.com/office/drawing/2014/main" id="{5FBC39EE-3F9C-3EB4-1BB3-6D4CA68C052F}"/>
-              </a:ext>
-            </a:extLst>
-          </p:cNvPr>
-          <p:cNvSpPr txBox="1"/>
-          <p:nvPr/>
-        </p:nvSpPr>
-        <p:spPr>
-          <a:xfrm>
-            <a:off x="2879436" y="4237221"/>
-            <a:ext cx="4844473" cy="369332"/>
-          </a:xfrm>
-          <a:prstGeom prst="rect">
-            <a:avLst/>
-          </a:prstGeom>
-          <a:noFill/>
-        </p:spPr>
-        <p:txBody>
-          <a:bodyPr wrap="square" rtlCol="0">
-            <a:spAutoFit/>
-          </a:bodyPr>
-          <a:lstStyle/>
-          <a:p>
-            <a:r>
-              <a:rPr lang="en-US" dirty="0"/>
-              <a:t>Image Guess: </a:t>
-            </a:r>
-            <a:r>
-              <a:rPr lang="en-US" u="sng" dirty="0"/>
-              <a:t>	Blank Image		</a:t>
-            </a:r>
-          </a:p>
-        </p:txBody>
-      </p:sp>
-      <p:sp>
-        <p:nvSpPr>
-          <p:cNvPr id="2" name="Rectangle: Rounded Corners 1">
-            <a:extLst>
-              <a:ext uri="{FF2B5EF4-FFF2-40B4-BE49-F238E27FC236}">
-                <a16:creationId xmlns:a16="http://schemas.microsoft.com/office/drawing/2014/main" id="{1822651B-D54D-8217-D2C3-CF3510538C29}"/>
-              </a:ext>
-            </a:extLst>
-          </p:cNvPr>
-          <p:cNvSpPr/>
-          <p:nvPr/>
-        </p:nvSpPr>
-        <p:spPr>
-          <a:xfrm>
-            <a:off x="7723909" y="4190460"/>
-            <a:ext cx="1797398" cy="462854"/>
-          </a:xfrm>
-          <a:prstGeom prst="roundRect">
-            <a:avLst/>
-          </a:prstGeom>
-        </p:spPr>
-        <p:style>
-          <a:lnRef idx="2">
-            <a:schemeClr val="accent1">
-              <a:shade val="15000"/>
-            </a:schemeClr>
-          </a:lnRef>
-          <a:fillRef idx="1">
-            <a:schemeClr val="accent1"/>
-          </a:fillRef>
-          <a:effectRef idx="0">
-            <a:schemeClr val="accent1"/>
-          </a:effectRef>
-          <a:fontRef idx="minor">
-            <a:schemeClr val="lt1"/>
-          </a:fontRef>
-        </p:style>
-        <p:txBody>
-          <a:bodyPr rtlCol="0" anchor="ctr"/>
-          <a:lstStyle/>
-          <a:p>
-            <a:pPr algn="ctr"/>
-            <a:r>
-              <a:rPr lang="en-US" dirty="0"/>
-              <a:t>Solve</a:t>
+              <a:t>Search</a:t>
             </a:r>
           </a:p>
         </p:txBody>
@@ -6587,18 +6945,13 @@
     </p:spTree>
     <p:extLst>
       <p:ext uri="{BB962C8B-B14F-4D97-AF65-F5344CB8AC3E}">
-        <p14:creationId xmlns:p14="http://schemas.microsoft.com/office/powerpoint/2010/main" val="2496678694"/>
+        <p14:creationId xmlns:p14="http://schemas.microsoft.com/office/powerpoint/2010/main" val="3101795238"/>
       </p:ext>
     </p:extLst>
   </p:cSld>
   <p:clrMapOvr>
     <a:masterClrMapping/>
   </p:clrMapOvr>
-  <p:extLst>
-    <p:ext uri="{6950BFC3-D8DA-4A85-94F7-54DA5524770B}">
-      <p188:commentRel xmlns:p188="http://schemas.microsoft.com/office/powerpoint/2018/8/main" r:id="rId3"/>
-    </p:ext>
-  </p:extLst>
 </p:sld>
 </file>
 
@@ -6621,6 +6974,552 @@
       </p:grpSpPr>
       <p:sp>
         <p:nvSpPr>
+          <p:cNvPr id="3" name="Rectangle 2">
+            <a:extLst>
+              <a:ext uri="{FF2B5EF4-FFF2-40B4-BE49-F238E27FC236}">
+                <a16:creationId xmlns:a16="http://schemas.microsoft.com/office/drawing/2014/main" id="{09EB6145-F196-BA75-4B3E-EED7851B2ACB}"/>
+              </a:ext>
+            </a:extLst>
+          </p:cNvPr>
+          <p:cNvSpPr/>
+          <p:nvPr/>
+        </p:nvSpPr>
+        <p:spPr>
+          <a:xfrm>
+            <a:off x="242835" y="200967"/>
+            <a:ext cx="11706330" cy="6451042"/>
+          </a:xfrm>
+          <a:prstGeom prst="rect">
+            <a:avLst/>
+          </a:prstGeom>
+          <a:solidFill>
+            <a:schemeClr val="bg1"/>
+          </a:solidFill>
+        </p:spPr>
+        <p:style>
+          <a:lnRef idx="2">
+            <a:schemeClr val="accent1">
+              <a:shade val="15000"/>
+            </a:schemeClr>
+          </a:lnRef>
+          <a:fillRef idx="1">
+            <a:schemeClr val="accent1"/>
+          </a:fillRef>
+          <a:effectRef idx="0">
+            <a:schemeClr val="accent1"/>
+          </a:effectRef>
+          <a:fontRef idx="minor">
+            <a:schemeClr val="lt1"/>
+          </a:fontRef>
+        </p:style>
+        <p:txBody>
+          <a:bodyPr rtlCol="0" anchor="ctr"/>
+          <a:lstStyle/>
+          <a:p>
+            <a:pPr algn="ctr"/>
+            <a:endParaRPr lang="en-US" dirty="0">
+              <a:solidFill>
+                <a:schemeClr val="tx1"/>
+              </a:solidFill>
+            </a:endParaRPr>
+          </a:p>
+        </p:txBody>
+      </p:sp>
+      <p:sp>
+        <p:nvSpPr>
+          <p:cNvPr id="9" name="Rectangle 8">
+            <a:extLst>
+              <a:ext uri="{FF2B5EF4-FFF2-40B4-BE49-F238E27FC236}">
+                <a16:creationId xmlns:a16="http://schemas.microsoft.com/office/drawing/2014/main" id="{F50557A8-8943-F711-C854-1442083C28F3}"/>
+              </a:ext>
+            </a:extLst>
+          </p:cNvPr>
+          <p:cNvSpPr/>
+          <p:nvPr/>
+        </p:nvSpPr>
+        <p:spPr>
+          <a:xfrm>
+            <a:off x="2558980" y="1075172"/>
+            <a:ext cx="7074040" cy="5576837"/>
+          </a:xfrm>
+          <a:prstGeom prst="rect">
+            <a:avLst/>
+          </a:prstGeom>
+          <a:noFill/>
+        </p:spPr>
+        <p:style>
+          <a:lnRef idx="2">
+            <a:schemeClr val="accent1">
+              <a:shade val="15000"/>
+            </a:schemeClr>
+          </a:lnRef>
+          <a:fillRef idx="1">
+            <a:schemeClr val="accent1"/>
+          </a:fillRef>
+          <a:effectRef idx="0">
+            <a:schemeClr val="accent1"/>
+          </a:effectRef>
+          <a:fontRef idx="minor">
+            <a:schemeClr val="lt1"/>
+          </a:fontRef>
+        </p:style>
+        <p:txBody>
+          <a:bodyPr rtlCol="0" anchor="ctr"/>
+          <a:lstStyle/>
+          <a:p>
+            <a:pPr algn="ctr"/>
+            <a:endParaRPr lang="en-US" dirty="0"/>
+          </a:p>
+        </p:txBody>
+      </p:sp>
+      <p:sp>
+        <p:nvSpPr>
+          <p:cNvPr id="15" name="Rectangle 14">
+            <a:extLst>
+              <a:ext uri="{FF2B5EF4-FFF2-40B4-BE49-F238E27FC236}">
+                <a16:creationId xmlns:a16="http://schemas.microsoft.com/office/drawing/2014/main" id="{2F28C8CE-0641-4BDC-3993-118AA2F43F1D}"/>
+              </a:ext>
+            </a:extLst>
+          </p:cNvPr>
+          <p:cNvSpPr/>
+          <p:nvPr/>
+        </p:nvSpPr>
+        <p:spPr>
+          <a:xfrm>
+            <a:off x="242835" y="200966"/>
+            <a:ext cx="11706330" cy="874206"/>
+          </a:xfrm>
+          <a:prstGeom prst="rect">
+            <a:avLst/>
+          </a:prstGeom>
+          <a:noFill/>
+        </p:spPr>
+        <p:style>
+          <a:lnRef idx="2">
+            <a:schemeClr val="accent1">
+              <a:shade val="15000"/>
+            </a:schemeClr>
+          </a:lnRef>
+          <a:fillRef idx="1">
+            <a:schemeClr val="accent1"/>
+          </a:fillRef>
+          <a:effectRef idx="0">
+            <a:schemeClr val="accent1"/>
+          </a:effectRef>
+          <a:fontRef idx="minor">
+            <a:schemeClr val="lt1"/>
+          </a:fontRef>
+        </p:style>
+        <p:txBody>
+          <a:bodyPr rtlCol="0" anchor="ctr"/>
+          <a:lstStyle/>
+          <a:p>
+            <a:pPr algn="ctr"/>
+            <a:r>
+              <a:rPr lang="en-US" dirty="0">
+                <a:solidFill>
+                  <a:schemeClr val="tx1"/>
+                </a:solidFill>
+              </a:rPr>
+              <a:t>Image Sharing	</a:t>
+            </a:r>
+            <a:r>
+              <a:rPr lang="en-US" u="sng" dirty="0">
+                <a:solidFill>
+                  <a:schemeClr val="tx1"/>
+                </a:solidFill>
+              </a:rPr>
+              <a:t>Image Creation</a:t>
+            </a:r>
+            <a:r>
+              <a:rPr lang="en-US" dirty="0">
+                <a:solidFill>
+                  <a:schemeClr val="tx1"/>
+                </a:solidFill>
+              </a:rPr>
+              <a:t>	Leaderboard	</a:t>
+            </a:r>
+          </a:p>
+        </p:txBody>
+      </p:sp>
+      <p:sp>
+        <p:nvSpPr>
+          <p:cNvPr id="31" name="Rectangle: Rounded Corners 30">
+            <a:extLst>
+              <a:ext uri="{FF2B5EF4-FFF2-40B4-BE49-F238E27FC236}">
+                <a16:creationId xmlns:a16="http://schemas.microsoft.com/office/drawing/2014/main" id="{A64B17D0-F6E3-8952-7582-8E8820143122}"/>
+              </a:ext>
+            </a:extLst>
+          </p:cNvPr>
+          <p:cNvSpPr/>
+          <p:nvPr/>
+        </p:nvSpPr>
+        <p:spPr>
+          <a:xfrm>
+            <a:off x="10009415" y="439613"/>
+            <a:ext cx="1797398" cy="462854"/>
+          </a:xfrm>
+          <a:prstGeom prst="roundRect">
+            <a:avLst/>
+          </a:prstGeom>
+        </p:spPr>
+        <p:style>
+          <a:lnRef idx="2">
+            <a:schemeClr val="accent1">
+              <a:shade val="15000"/>
+            </a:schemeClr>
+          </a:lnRef>
+          <a:fillRef idx="1">
+            <a:schemeClr val="accent1"/>
+          </a:fillRef>
+          <a:effectRef idx="0">
+            <a:schemeClr val="accent1"/>
+          </a:effectRef>
+          <a:fontRef idx="minor">
+            <a:schemeClr val="lt1"/>
+          </a:fontRef>
+        </p:style>
+        <p:txBody>
+          <a:bodyPr rtlCol="0" anchor="ctr"/>
+          <a:lstStyle/>
+          <a:p>
+            <a:pPr algn="ctr"/>
+            <a:r>
+              <a:rPr lang="en-US" dirty="0"/>
+              <a:t>Logout</a:t>
+            </a:r>
+          </a:p>
+        </p:txBody>
+      </p:sp>
+      <p:sp>
+        <p:nvSpPr>
+          <p:cNvPr id="4" name="Rectangle 3">
+            <a:extLst>
+              <a:ext uri="{FF2B5EF4-FFF2-40B4-BE49-F238E27FC236}">
+                <a16:creationId xmlns:a16="http://schemas.microsoft.com/office/drawing/2014/main" id="{3D5AC6B3-9861-021C-A412-59E7DD7737AD}"/>
+              </a:ext>
+            </a:extLst>
+          </p:cNvPr>
+          <p:cNvSpPr/>
+          <p:nvPr/>
+        </p:nvSpPr>
+        <p:spPr>
+          <a:xfrm>
+            <a:off x="2632364" y="1202890"/>
+            <a:ext cx="6927272" cy="350982"/>
+          </a:xfrm>
+          <a:prstGeom prst="rect">
+            <a:avLst/>
+          </a:prstGeom>
+        </p:spPr>
+        <p:style>
+          <a:lnRef idx="2">
+            <a:schemeClr val="accent1">
+              <a:shade val="15000"/>
+            </a:schemeClr>
+          </a:lnRef>
+          <a:fillRef idx="1">
+            <a:schemeClr val="accent1"/>
+          </a:fillRef>
+          <a:effectRef idx="0">
+            <a:schemeClr val="accent1"/>
+          </a:effectRef>
+          <a:fontRef idx="minor">
+            <a:schemeClr val="lt1"/>
+          </a:fontRef>
+        </p:style>
+        <p:txBody>
+          <a:bodyPr rtlCol="0" anchor="ctr"/>
+          <a:lstStyle/>
+          <a:p>
+            <a:pPr algn="ctr"/>
+            <a:r>
+              <a:rPr lang="en-US" dirty="0"/>
+              <a:t>Create Image</a:t>
+            </a:r>
+          </a:p>
+        </p:txBody>
+      </p:sp>
+      <p:sp>
+        <p:nvSpPr>
+          <p:cNvPr id="5" name="Rectangle 4">
+            <a:extLst>
+              <a:ext uri="{FF2B5EF4-FFF2-40B4-BE49-F238E27FC236}">
+                <a16:creationId xmlns:a16="http://schemas.microsoft.com/office/drawing/2014/main" id="{06824CD3-D12A-62B2-5326-F98F040F9FE2}"/>
+              </a:ext>
+            </a:extLst>
+          </p:cNvPr>
+          <p:cNvSpPr/>
+          <p:nvPr/>
+        </p:nvSpPr>
+        <p:spPr>
+          <a:xfrm>
+            <a:off x="4022437" y="2165712"/>
+            <a:ext cx="4147127" cy="1948873"/>
+          </a:xfrm>
+          <a:prstGeom prst="rect">
+            <a:avLst/>
+          </a:prstGeom>
+        </p:spPr>
+        <p:style>
+          <a:lnRef idx="2">
+            <a:schemeClr val="accent1">
+              <a:shade val="15000"/>
+            </a:schemeClr>
+          </a:lnRef>
+          <a:fillRef idx="1">
+            <a:schemeClr val="accent1"/>
+          </a:fillRef>
+          <a:effectRef idx="0">
+            <a:schemeClr val="accent1"/>
+          </a:effectRef>
+          <a:fontRef idx="minor">
+            <a:schemeClr val="lt1"/>
+          </a:fontRef>
+        </p:style>
+        <p:txBody>
+          <a:bodyPr rtlCol="0" anchor="ctr"/>
+          <a:lstStyle/>
+          <a:p>
+            <a:pPr algn="ctr"/>
+            <a:r>
+              <a:rPr lang="en-US" dirty="0"/>
+              <a:t>Image</a:t>
+            </a:r>
+          </a:p>
+        </p:txBody>
+      </p:sp>
+      <p:sp>
+        <p:nvSpPr>
+          <p:cNvPr id="6" name="TextBox 5">
+            <a:extLst>
+              <a:ext uri="{FF2B5EF4-FFF2-40B4-BE49-F238E27FC236}">
+                <a16:creationId xmlns:a16="http://schemas.microsoft.com/office/drawing/2014/main" id="{89BF0A95-DC74-5FBD-2740-EEAF6A0D4F41}"/>
+              </a:ext>
+            </a:extLst>
+          </p:cNvPr>
+          <p:cNvSpPr txBox="1"/>
+          <p:nvPr/>
+        </p:nvSpPr>
+        <p:spPr>
+          <a:xfrm>
+            <a:off x="4022437" y="1801663"/>
+            <a:ext cx="4147127" cy="369332"/>
+          </a:xfrm>
+          <a:prstGeom prst="rect">
+            <a:avLst/>
+          </a:prstGeom>
+          <a:noFill/>
+        </p:spPr>
+        <p:txBody>
+          <a:bodyPr wrap="square" rtlCol="0">
+            <a:spAutoFit/>
+          </a:bodyPr>
+          <a:lstStyle/>
+          <a:p>
+            <a:r>
+              <a:rPr lang="en-US" dirty="0"/>
+              <a:t>Posted By: User1234</a:t>
+            </a:r>
+          </a:p>
+        </p:txBody>
+      </p:sp>
+      <p:cxnSp>
+        <p:nvCxnSpPr>
+          <p:cNvPr id="7" name="Straight Connector 6">
+            <a:extLst>
+              <a:ext uri="{FF2B5EF4-FFF2-40B4-BE49-F238E27FC236}">
+                <a16:creationId xmlns:a16="http://schemas.microsoft.com/office/drawing/2014/main" id="{0750715A-4B3C-3E56-E625-8ED0C18AA708}"/>
+              </a:ext>
+            </a:extLst>
+          </p:cNvPr>
+          <p:cNvCxnSpPr>
+            <a:cxnSpLocks/>
+          </p:cNvCxnSpPr>
+          <p:nvPr/>
+        </p:nvCxnSpPr>
+        <p:spPr>
+          <a:xfrm>
+            <a:off x="2632364" y="4754735"/>
+            <a:ext cx="7074040" cy="0"/>
+          </a:xfrm>
+          <a:prstGeom prst="line">
+            <a:avLst/>
+          </a:prstGeom>
+        </p:spPr>
+        <p:style>
+          <a:lnRef idx="1">
+            <a:schemeClr val="dk1"/>
+          </a:lnRef>
+          <a:fillRef idx="0">
+            <a:schemeClr val="dk1"/>
+          </a:fillRef>
+          <a:effectRef idx="0">
+            <a:schemeClr val="dk1"/>
+          </a:effectRef>
+          <a:fontRef idx="minor">
+            <a:schemeClr val="tx1"/>
+          </a:fontRef>
+        </p:style>
+      </p:cxnSp>
+      <p:cxnSp>
+        <p:nvCxnSpPr>
+          <p:cNvPr id="12" name="Straight Connector 11">
+            <a:extLst>
+              <a:ext uri="{FF2B5EF4-FFF2-40B4-BE49-F238E27FC236}">
+                <a16:creationId xmlns:a16="http://schemas.microsoft.com/office/drawing/2014/main" id="{6AFB503F-4545-4914-BED9-3FF093077284}"/>
+              </a:ext>
+            </a:extLst>
+          </p:cNvPr>
+          <p:cNvCxnSpPr>
+            <a:cxnSpLocks/>
+          </p:cNvCxnSpPr>
+          <p:nvPr/>
+        </p:nvCxnSpPr>
+        <p:spPr>
+          <a:xfrm>
+            <a:off x="2558980" y="1767344"/>
+            <a:ext cx="7074040" cy="0"/>
+          </a:xfrm>
+          <a:prstGeom prst="line">
+            <a:avLst/>
+          </a:prstGeom>
+        </p:spPr>
+        <p:style>
+          <a:lnRef idx="1">
+            <a:schemeClr val="dk1"/>
+          </a:lnRef>
+          <a:fillRef idx="0">
+            <a:schemeClr val="dk1"/>
+          </a:fillRef>
+          <a:effectRef idx="0">
+            <a:schemeClr val="dk1"/>
+          </a:effectRef>
+          <a:fontRef idx="minor">
+            <a:schemeClr val="tx1"/>
+          </a:fontRef>
+        </p:style>
+      </p:cxnSp>
+      <p:sp>
+        <p:nvSpPr>
+          <p:cNvPr id="13" name="TextBox 12">
+            <a:extLst>
+              <a:ext uri="{FF2B5EF4-FFF2-40B4-BE49-F238E27FC236}">
+                <a16:creationId xmlns:a16="http://schemas.microsoft.com/office/drawing/2014/main" id="{5FBC39EE-3F9C-3EB4-1BB3-6D4CA68C052F}"/>
+              </a:ext>
+            </a:extLst>
+          </p:cNvPr>
+          <p:cNvSpPr txBox="1"/>
+          <p:nvPr/>
+        </p:nvSpPr>
+        <p:spPr>
+          <a:xfrm>
+            <a:off x="2879436" y="4237221"/>
+            <a:ext cx="4844473" cy="369332"/>
+          </a:xfrm>
+          <a:prstGeom prst="rect">
+            <a:avLst/>
+          </a:prstGeom>
+          <a:noFill/>
+        </p:spPr>
+        <p:txBody>
+          <a:bodyPr wrap="square" rtlCol="0">
+            <a:spAutoFit/>
+          </a:bodyPr>
+          <a:lstStyle/>
+          <a:p>
+            <a:r>
+              <a:rPr lang="en-US" dirty="0"/>
+              <a:t>Image Guess: </a:t>
+            </a:r>
+            <a:r>
+              <a:rPr lang="en-US" u="sng" dirty="0"/>
+              <a:t>	Blank Image		</a:t>
+            </a:r>
+          </a:p>
+        </p:txBody>
+      </p:sp>
+      <p:sp>
+        <p:nvSpPr>
+          <p:cNvPr id="2" name="Rectangle: Rounded Corners 1">
+            <a:extLst>
+              <a:ext uri="{FF2B5EF4-FFF2-40B4-BE49-F238E27FC236}">
+                <a16:creationId xmlns:a16="http://schemas.microsoft.com/office/drawing/2014/main" id="{1822651B-D54D-8217-D2C3-CF3510538C29}"/>
+              </a:ext>
+            </a:extLst>
+          </p:cNvPr>
+          <p:cNvSpPr/>
+          <p:nvPr/>
+        </p:nvSpPr>
+        <p:spPr>
+          <a:xfrm>
+            <a:off x="7723909" y="4190460"/>
+            <a:ext cx="1797398" cy="462854"/>
+          </a:xfrm>
+          <a:prstGeom prst="roundRect">
+            <a:avLst/>
+          </a:prstGeom>
+        </p:spPr>
+        <p:style>
+          <a:lnRef idx="2">
+            <a:schemeClr val="accent1">
+              <a:shade val="15000"/>
+            </a:schemeClr>
+          </a:lnRef>
+          <a:fillRef idx="1">
+            <a:schemeClr val="accent1"/>
+          </a:fillRef>
+          <a:effectRef idx="0">
+            <a:schemeClr val="accent1"/>
+          </a:effectRef>
+          <a:fontRef idx="minor">
+            <a:schemeClr val="lt1"/>
+          </a:fontRef>
+        </p:style>
+        <p:txBody>
+          <a:bodyPr rtlCol="0" anchor="ctr"/>
+          <a:lstStyle/>
+          <a:p>
+            <a:pPr algn="ctr"/>
+            <a:r>
+              <a:rPr lang="en-US" dirty="0"/>
+              <a:t>Solve</a:t>
+            </a:r>
+          </a:p>
+        </p:txBody>
+      </p:sp>
+    </p:spTree>
+    <p:extLst>
+      <p:ext uri="{BB962C8B-B14F-4D97-AF65-F5344CB8AC3E}">
+        <p14:creationId xmlns:p14="http://schemas.microsoft.com/office/powerpoint/2010/main" val="2496678694"/>
+      </p:ext>
+    </p:extLst>
+  </p:cSld>
+  <p:clrMapOvr>
+    <a:masterClrMapping/>
+  </p:clrMapOvr>
+</p:sld>
+</file>
+
+<file path=ppt/slides/slide7.xml><?xml version="1.0" encoding="utf-8"?>
+<p:sld xmlns:a="http://schemas.openxmlformats.org/drawingml/2006/main" xmlns:r="http://schemas.openxmlformats.org/officeDocument/2006/relationships" xmlns:p="http://schemas.openxmlformats.org/presentationml/2006/main">
+  <p:cSld>
+    <p:spTree>
+      <p:nvGrpSpPr>
+        <p:cNvPr id="1" name=""/>
+        <p:cNvGrpSpPr/>
+        <p:nvPr/>
+      </p:nvGrpSpPr>
+      <p:grpSpPr>
+        <a:xfrm>
+          <a:off x="0" y="0"/>
+          <a:ext cx="0" cy="0"/>
+          <a:chOff x="0" y="0"/>
+          <a:chExt cx="0" cy="0"/>
+        </a:xfrm>
+      </p:grpSpPr>
+      <p:sp>
+        <p:nvSpPr>
           <p:cNvPr id="9" name="Rectangle 8">
             <a:extLst>
               <a:ext uri="{FF2B5EF4-FFF2-40B4-BE49-F238E27FC236}">
@@ -6936,11 +7835,6 @@
   <p:clrMapOvr>
     <a:masterClrMapping/>
   </p:clrMapOvr>
-  <p:extLst>
-    <p:ext uri="{6950BFC3-D8DA-4A85-94F7-54DA5524770B}">
-      <p188:commentRel xmlns:p188="http://schemas.microsoft.com/office/powerpoint/2018/8/main" r:id="rId3"/>
-    </p:ext>
-  </p:extLst>
 </p:sld>
 </file>
 

</xml_diff>

<commit_message>
updated typedef to include registering a user. - added task items I believe required to complete project
</commit_message>
<xml_diff>
--- a/documentation/final_project_planning.pptx
+++ b/documentation/final_project_planning.pptx
@@ -209,7 +209,7 @@
           <a:p>
             <a:fld id="{149ECEB6-B347-42A2-AFA6-6834FA678A79}" type="datetimeFigureOut">
               <a:rPr lang="en-US" smtClean="0"/>
-              <a:t>4/20/2024</a:t>
+              <a:t>4/29/2024</a:t>
             </a:fld>
             <a:endParaRPr lang="en-US"/>
           </a:p>
@@ -1127,7 +1127,7 @@
           <a:p>
             <a:fld id="{9F87B9EB-8124-4FED-A4DC-BE4B0CC78498}" type="datetimeFigureOut">
               <a:rPr lang="en-US" smtClean="0"/>
-              <a:t>4/20/2024</a:t>
+              <a:t>4/29/2024</a:t>
             </a:fld>
             <a:endParaRPr lang="en-US"/>
           </a:p>
@@ -1325,7 +1325,7 @@
           <a:p>
             <a:fld id="{9F87B9EB-8124-4FED-A4DC-BE4B0CC78498}" type="datetimeFigureOut">
               <a:rPr lang="en-US" smtClean="0"/>
-              <a:t>4/20/2024</a:t>
+              <a:t>4/29/2024</a:t>
             </a:fld>
             <a:endParaRPr lang="en-US"/>
           </a:p>
@@ -1533,7 +1533,7 @@
           <a:p>
             <a:fld id="{9F87B9EB-8124-4FED-A4DC-BE4B0CC78498}" type="datetimeFigureOut">
               <a:rPr lang="en-US" smtClean="0"/>
-              <a:t>4/20/2024</a:t>
+              <a:t>4/29/2024</a:t>
             </a:fld>
             <a:endParaRPr lang="en-US"/>
           </a:p>
@@ -1731,7 +1731,7 @@
           <a:p>
             <a:fld id="{9F87B9EB-8124-4FED-A4DC-BE4B0CC78498}" type="datetimeFigureOut">
               <a:rPr lang="en-US" smtClean="0"/>
-              <a:t>4/20/2024</a:t>
+              <a:t>4/29/2024</a:t>
             </a:fld>
             <a:endParaRPr lang="en-US"/>
           </a:p>
@@ -2006,7 +2006,7 @@
           <a:p>
             <a:fld id="{9F87B9EB-8124-4FED-A4DC-BE4B0CC78498}" type="datetimeFigureOut">
               <a:rPr lang="en-US" smtClean="0"/>
-              <a:t>4/20/2024</a:t>
+              <a:t>4/29/2024</a:t>
             </a:fld>
             <a:endParaRPr lang="en-US"/>
           </a:p>
@@ -2271,7 +2271,7 @@
           <a:p>
             <a:fld id="{9F87B9EB-8124-4FED-A4DC-BE4B0CC78498}" type="datetimeFigureOut">
               <a:rPr lang="en-US" smtClean="0"/>
-              <a:t>4/20/2024</a:t>
+              <a:t>4/29/2024</a:t>
             </a:fld>
             <a:endParaRPr lang="en-US"/>
           </a:p>
@@ -2683,7 +2683,7 @@
           <a:p>
             <a:fld id="{9F87B9EB-8124-4FED-A4DC-BE4B0CC78498}" type="datetimeFigureOut">
               <a:rPr lang="en-US" smtClean="0"/>
-              <a:t>4/20/2024</a:t>
+              <a:t>4/29/2024</a:t>
             </a:fld>
             <a:endParaRPr lang="en-US"/>
           </a:p>
@@ -2824,7 +2824,7 @@
           <a:p>
             <a:fld id="{9F87B9EB-8124-4FED-A4DC-BE4B0CC78498}" type="datetimeFigureOut">
               <a:rPr lang="en-US" smtClean="0"/>
-              <a:t>4/20/2024</a:t>
+              <a:t>4/29/2024</a:t>
             </a:fld>
             <a:endParaRPr lang="en-US"/>
           </a:p>
@@ -2937,7 +2937,7 @@
           <a:p>
             <a:fld id="{9F87B9EB-8124-4FED-A4DC-BE4B0CC78498}" type="datetimeFigureOut">
               <a:rPr lang="en-US" smtClean="0"/>
-              <a:t>4/20/2024</a:t>
+              <a:t>4/29/2024</a:t>
             </a:fld>
             <a:endParaRPr lang="en-US"/>
           </a:p>
@@ -3248,7 +3248,7 @@
           <a:p>
             <a:fld id="{9F87B9EB-8124-4FED-A4DC-BE4B0CC78498}" type="datetimeFigureOut">
               <a:rPr lang="en-US" smtClean="0"/>
-              <a:t>4/20/2024</a:t>
+              <a:t>4/29/2024</a:t>
             </a:fld>
             <a:endParaRPr lang="en-US"/>
           </a:p>
@@ -3536,7 +3536,7 @@
           <a:p>
             <a:fld id="{9F87B9EB-8124-4FED-A4DC-BE4B0CC78498}" type="datetimeFigureOut">
               <a:rPr lang="en-US" smtClean="0"/>
-              <a:t>4/20/2024</a:t>
+              <a:t>4/29/2024</a:t>
             </a:fld>
             <a:endParaRPr lang="en-US"/>
           </a:p>
@@ -3777,7 +3777,7 @@
           <a:p>
             <a:fld id="{9F87B9EB-8124-4FED-A4DC-BE4B0CC78498}" type="datetimeFigureOut">
               <a:rPr lang="en-US" smtClean="0"/>
-              <a:t>4/20/2024</a:t>
+              <a:t>4/29/2024</a:t>
             </a:fld>
             <a:endParaRPr lang="en-US"/>
           </a:p>
@@ -5142,6 +5142,98 @@
           <a:xfrm flipV="1">
             <a:off x="5357446" y="4987572"/>
             <a:ext cx="738554" cy="370318"/>
+          </a:xfrm>
+          <a:prstGeom prst="straightConnector1">
+            <a:avLst/>
+          </a:prstGeom>
+          <a:ln>
+            <a:tailEnd type="triangle"/>
+          </a:ln>
+        </p:spPr>
+        <p:style>
+          <a:lnRef idx="1">
+            <a:schemeClr val="dk1"/>
+          </a:lnRef>
+          <a:fillRef idx="0">
+            <a:schemeClr val="dk1"/>
+          </a:fillRef>
+          <a:effectRef idx="0">
+            <a:schemeClr val="dk1"/>
+          </a:effectRef>
+          <a:fontRef idx="minor">
+            <a:schemeClr val="tx1"/>
+          </a:fontRef>
+        </p:style>
+      </p:cxnSp>
+      <p:sp>
+        <p:nvSpPr>
+          <p:cNvPr id="2" name="Rectangle: Rounded Corners 1">
+            <a:extLst>
+              <a:ext uri="{FF2B5EF4-FFF2-40B4-BE49-F238E27FC236}">
+                <a16:creationId xmlns:a16="http://schemas.microsoft.com/office/drawing/2014/main" id="{19EA9C64-546F-4223-5BCA-95016DE5C4D2}"/>
+              </a:ext>
+            </a:extLst>
+          </p:cNvPr>
+          <p:cNvSpPr/>
+          <p:nvPr/>
+        </p:nvSpPr>
+        <p:spPr>
+          <a:xfrm>
+            <a:off x="6096000" y="2174033"/>
+            <a:ext cx="1770189" cy="851448"/>
+          </a:xfrm>
+          <a:prstGeom prst="roundRect">
+            <a:avLst/>
+          </a:prstGeom>
+        </p:spPr>
+        <p:style>
+          <a:lnRef idx="2">
+            <a:schemeClr val="accent1">
+              <a:shade val="15000"/>
+            </a:schemeClr>
+          </a:lnRef>
+          <a:fillRef idx="1">
+            <a:schemeClr val="accent1"/>
+          </a:fillRef>
+          <a:effectRef idx="0">
+            <a:schemeClr val="accent1"/>
+          </a:effectRef>
+          <a:fontRef idx="minor">
+            <a:schemeClr val="lt1"/>
+          </a:fontRef>
+        </p:style>
+        <p:txBody>
+          <a:bodyPr rtlCol="0" anchor="ctr"/>
+          <a:lstStyle/>
+          <a:p>
+            <a:pPr algn="ctr"/>
+            <a:r>
+              <a:rPr lang="en-US" dirty="0"/>
+              <a:t>[Leaderboard User Component]</a:t>
+            </a:r>
+          </a:p>
+        </p:txBody>
+      </p:sp>
+      <p:cxnSp>
+        <p:nvCxnSpPr>
+          <p:cNvPr id="3" name="Straight Arrow Connector 2">
+            <a:extLst>
+              <a:ext uri="{FF2B5EF4-FFF2-40B4-BE49-F238E27FC236}">
+                <a16:creationId xmlns:a16="http://schemas.microsoft.com/office/drawing/2014/main" id="{4CF7A22F-F5ED-6299-C745-515D724BA06B}"/>
+              </a:ext>
+            </a:extLst>
+          </p:cNvPr>
+          <p:cNvCxnSpPr>
+            <a:cxnSpLocks/>
+            <a:stCxn id="14" idx="3"/>
+            <a:endCxn id="2" idx="1"/>
+          </p:cNvCxnSpPr>
+          <p:nvPr/>
+        </p:nvCxnSpPr>
+        <p:spPr>
+          <a:xfrm flipV="1">
+            <a:off x="5357446" y="2599757"/>
+            <a:ext cx="738554" cy="47391"/>
           </a:xfrm>
           <a:prstGeom prst="straightConnector1">
             <a:avLst/>

</xml_diff>